<commit_message>
renaming files, designing content
</commit_message>
<xml_diff>
--- a/slides/custom-reference.pptx
+++ b/slides/custom-reference.pptx
@@ -2,24 +2,24 @@
 <file path=ppt/presentation.xml><?xml version="1.0" encoding="utf-8"?>
 <p:presentation xmlns:a="http://schemas.openxmlformats.org/drawingml/2006/main" xmlns:r="http://schemas.openxmlformats.org/officeDocument/2006/relationships" xmlns:p="http://schemas.openxmlformats.org/presentationml/2006/main" saveSubsetFonts="1" autoCompressPictures="0">
   <p:sldMasterIdLst>
-    <p:sldMasterId id="2147483738" r:id="rId1"/>
+    <p:sldMasterId id="2147483726" r:id="rId1"/>
   </p:sldMasterIdLst>
   <p:notesMasterIdLst>
     <p:notesMasterId r:id="rId6"/>
   </p:notesMasterIdLst>
   <p:sldIdLst>
-    <p:sldId id="256" r:id="rId2"/>
-    <p:sldId id="257" r:id="rId3"/>
-    <p:sldId id="258" r:id="rId4"/>
-    <p:sldId id="259" r:id="rId5"/>
+    <p:sldId id="260" r:id="rId2"/>
+    <p:sldId id="261" r:id="rId3"/>
+    <p:sldId id="262" r:id="rId4"/>
+    <p:sldId id="263" r:id="rId5"/>
   </p:sldIdLst>
-  <p:sldSz cx="9906000" cy="6858000" type="A4"/>
+  <p:sldSz cx="12192000" cy="6858000"/>
   <p:notesSz cx="6858000" cy="9144000"/>
   <p:defaultTextStyle>
     <a:defPPr>
       <a:defRPr lang="en-US"/>
     </a:defPPr>
-    <a:lvl1pPr marL="0" algn="l" defTabSz="457200" rtl="0" eaLnBrk="1" latinLnBrk="0" hangingPunct="1">
+    <a:lvl1pPr marL="0" algn="l" defTabSz="914400" rtl="0" eaLnBrk="1" latinLnBrk="0" hangingPunct="1">
       <a:defRPr sz="1800" kern="1200">
         <a:solidFill>
           <a:schemeClr val="tx1"/>
@@ -29,7 +29,7 @@
         <a:cs typeface="+mn-cs"/>
       </a:defRPr>
     </a:lvl1pPr>
-    <a:lvl2pPr marL="457200" algn="l" defTabSz="457200" rtl="0" eaLnBrk="1" latinLnBrk="0" hangingPunct="1">
+    <a:lvl2pPr marL="457200" algn="l" defTabSz="914400" rtl="0" eaLnBrk="1" latinLnBrk="0" hangingPunct="1">
       <a:defRPr sz="1800" kern="1200">
         <a:solidFill>
           <a:schemeClr val="tx1"/>
@@ -39,7 +39,7 @@
         <a:cs typeface="+mn-cs"/>
       </a:defRPr>
     </a:lvl2pPr>
-    <a:lvl3pPr marL="914400" algn="l" defTabSz="457200" rtl="0" eaLnBrk="1" latinLnBrk="0" hangingPunct="1">
+    <a:lvl3pPr marL="914400" algn="l" defTabSz="914400" rtl="0" eaLnBrk="1" latinLnBrk="0" hangingPunct="1">
       <a:defRPr sz="1800" kern="1200">
         <a:solidFill>
           <a:schemeClr val="tx1"/>
@@ -49,7 +49,7 @@
         <a:cs typeface="+mn-cs"/>
       </a:defRPr>
     </a:lvl3pPr>
-    <a:lvl4pPr marL="1371600" algn="l" defTabSz="457200" rtl="0" eaLnBrk="1" latinLnBrk="0" hangingPunct="1">
+    <a:lvl4pPr marL="1371600" algn="l" defTabSz="914400" rtl="0" eaLnBrk="1" latinLnBrk="0" hangingPunct="1">
       <a:defRPr sz="1800" kern="1200">
         <a:solidFill>
           <a:schemeClr val="tx1"/>
@@ -59,7 +59,7 @@
         <a:cs typeface="+mn-cs"/>
       </a:defRPr>
     </a:lvl4pPr>
-    <a:lvl5pPr marL="1828800" algn="l" defTabSz="457200" rtl="0" eaLnBrk="1" latinLnBrk="0" hangingPunct="1">
+    <a:lvl5pPr marL="1828800" algn="l" defTabSz="914400" rtl="0" eaLnBrk="1" latinLnBrk="0" hangingPunct="1">
       <a:defRPr sz="1800" kern="1200">
         <a:solidFill>
           <a:schemeClr val="tx1"/>
@@ -69,7 +69,7 @@
         <a:cs typeface="+mn-cs"/>
       </a:defRPr>
     </a:lvl5pPr>
-    <a:lvl6pPr marL="2286000" algn="l" defTabSz="457200" rtl="0" eaLnBrk="1" latinLnBrk="0" hangingPunct="1">
+    <a:lvl6pPr marL="2286000" algn="l" defTabSz="914400" rtl="0" eaLnBrk="1" latinLnBrk="0" hangingPunct="1">
       <a:defRPr sz="1800" kern="1200">
         <a:solidFill>
           <a:schemeClr val="tx1"/>
@@ -79,7 +79,7 @@
         <a:cs typeface="+mn-cs"/>
       </a:defRPr>
     </a:lvl6pPr>
-    <a:lvl7pPr marL="2743200" algn="l" defTabSz="457200" rtl="0" eaLnBrk="1" latinLnBrk="0" hangingPunct="1">
+    <a:lvl7pPr marL="2743200" algn="l" defTabSz="914400" rtl="0" eaLnBrk="1" latinLnBrk="0" hangingPunct="1">
       <a:defRPr sz="1800" kern="1200">
         <a:solidFill>
           <a:schemeClr val="tx1"/>
@@ -89,7 +89,7 @@
         <a:cs typeface="+mn-cs"/>
       </a:defRPr>
     </a:lvl7pPr>
-    <a:lvl8pPr marL="3200400" algn="l" defTabSz="457200" rtl="0" eaLnBrk="1" latinLnBrk="0" hangingPunct="1">
+    <a:lvl8pPr marL="3200400" algn="l" defTabSz="914400" rtl="0" eaLnBrk="1" latinLnBrk="0" hangingPunct="1">
       <a:defRPr sz="1800" kern="1200">
         <a:solidFill>
           <a:schemeClr val="tx1"/>
@@ -99,7 +99,7 @@
         <a:cs typeface="+mn-cs"/>
       </a:defRPr>
     </a:lvl8pPr>
-    <a:lvl9pPr marL="3657600" algn="l" defTabSz="457200" rtl="0" eaLnBrk="1" latinLnBrk="0" hangingPunct="1">
+    <a:lvl9pPr marL="3657600" algn="l" defTabSz="914400" rtl="0" eaLnBrk="1" latinLnBrk="0" hangingPunct="1">
       <a:defRPr sz="1800" kern="1200">
         <a:solidFill>
           <a:schemeClr val="tx1"/>
@@ -118,7 +118,7 @@
             <a:srgbClr val="A4A3A4"/>
           </p15:clr>
         </p15:guide>
-        <p15:guide id="2" pos="3120" userDrawn="1">
+        <p15:guide id="2" pos="3840" userDrawn="1">
           <p15:clr>
             <a:srgbClr val="A4A3A4"/>
           </p15:clr>
@@ -229,8 +229,8 @@
         </p:nvSpPr>
         <p:spPr>
           <a:xfrm>
-            <a:off x="1200150" y="1143000"/>
-            <a:ext cx="4457700" cy="3086100"/>
+            <a:off x="685800" y="1143000"/>
+            <a:ext cx="5486400" cy="3086100"/>
           </a:xfrm>
           <a:prstGeom prst="rect">
             <a:avLst/>
@@ -478,213 +478,6 @@
 </p:notesMaster>
 </file>
 
-<file path=ppt/notesSlides/notesSlide1.xml><?xml version="1.0" encoding="utf-8"?>
-<p:notes xmlns:a="http://schemas.openxmlformats.org/drawingml/2006/main" xmlns:r="http://schemas.openxmlformats.org/officeDocument/2006/relationships" xmlns:p="http://schemas.openxmlformats.org/presentationml/2006/main">
-  <p:cSld>
-    <p:spTree>
-      <p:nvGrpSpPr>
-        <p:cNvPr id="1" name=""/>
-        <p:cNvGrpSpPr/>
-        <p:nvPr/>
-      </p:nvGrpSpPr>
-      <p:grpSpPr>
-        <a:xfrm>
-          <a:off x="0" y="0"/>
-          <a:ext cx="0" cy="0"/>
-          <a:chOff x="0" y="0"/>
-          <a:chExt cx="0" cy="0"/>
-        </a:xfrm>
-      </p:grpSpPr>
-      <p:sp>
-        <p:nvSpPr>
-          <p:cNvPr id="2" name="Slide Image Placeholder 1"/>
-          <p:cNvSpPr>
-            <a:spLocks noGrp="1" noRot="1" noChangeAspect="1"/>
-          </p:cNvSpPr>
-          <p:nvPr>
-            <p:ph type="sldImg"/>
-          </p:nvPr>
-        </p:nvSpPr>
-        <p:spPr>
-          <a:xfrm>
-            <a:off x="1200150" y="1143000"/>
-            <a:ext cx="4457700" cy="3086100"/>
-          </a:xfrm>
-        </p:spPr>
-      </p:sp>
-      <p:sp>
-        <p:nvSpPr>
-          <p:cNvPr id="3" name="Notes Placeholder 2"/>
-          <p:cNvSpPr>
-            <a:spLocks noGrp="1"/>
-          </p:cNvSpPr>
-          <p:nvPr>
-            <p:ph type="body" idx="1"/>
-          </p:nvPr>
-        </p:nvSpPr>
-        <p:spPr/>
-        <p:txBody>
-          <a:bodyPr/>
-          <a:lstStyle/>
-          <a:p>
-            <a:r>
-              <a:rPr lang="en-US" dirty="0"/>
-              <a:t>Here</a:t>
-            </a:r>
-            <a:r>
-              <a:rPr lang="en-US" baseline="0" dirty="0"/>
-              <a:t> is a note</a:t>
-            </a:r>
-          </a:p>
-          <a:p>
-            <a:endParaRPr lang="en-US" baseline="0" dirty="0"/>
-          </a:p>
-          <a:p>
-            <a:r>
-              <a:rPr lang="en-US" baseline="0" dirty="0"/>
-              <a:t>With another paragraph.</a:t>
-            </a:r>
-            <a:endParaRPr lang="en-US" dirty="0"/>
-          </a:p>
-        </p:txBody>
-      </p:sp>
-      <p:sp>
-        <p:nvSpPr>
-          <p:cNvPr id="4" name="Slide Number Placeholder 3"/>
-          <p:cNvSpPr>
-            <a:spLocks noGrp="1"/>
-          </p:cNvSpPr>
-          <p:nvPr>
-            <p:ph type="sldNum" sz="quarter" idx="10"/>
-          </p:nvPr>
-        </p:nvSpPr>
-        <p:spPr/>
-        <p:txBody>
-          <a:bodyPr/>
-          <a:lstStyle/>
-          <a:p>
-            <a:fld id="{18BDFEC3-8487-43E8-A154-7C12CBC1FFF2}" type="slidenum">
-              <a:rPr lang="en-US" smtClean="0"/>
-              <a:t>1</a:t>
-            </a:fld>
-            <a:endParaRPr lang="en-US"/>
-          </a:p>
-        </p:txBody>
-      </p:sp>
-    </p:spTree>
-    <p:extLst>
-      <p:ext uri="{BB962C8B-B14F-4D97-AF65-F5344CB8AC3E}">
-        <p14:creationId xmlns:p14="http://schemas.microsoft.com/office/powerpoint/2010/main" val="3171319170"/>
-      </p:ext>
-    </p:extLst>
-  </p:cSld>
-  <p:clrMapOvr>
-    <a:masterClrMapping/>
-  </p:clrMapOvr>
-</p:notes>
-</file>
-
-<file path=ppt/notesSlides/notesSlide2.xml><?xml version="1.0" encoding="utf-8"?>
-<p:notes xmlns:a="http://schemas.openxmlformats.org/drawingml/2006/main" xmlns:r="http://schemas.openxmlformats.org/officeDocument/2006/relationships" xmlns:p="http://schemas.openxmlformats.org/presentationml/2006/main">
-  <p:cSld>
-    <p:spTree>
-      <p:nvGrpSpPr>
-        <p:cNvPr id="1" name=""/>
-        <p:cNvGrpSpPr/>
-        <p:nvPr/>
-      </p:nvGrpSpPr>
-      <p:grpSpPr>
-        <a:xfrm>
-          <a:off x="0" y="0"/>
-          <a:ext cx="0" cy="0"/>
-          <a:chOff x="0" y="0"/>
-          <a:chExt cx="0" cy="0"/>
-        </a:xfrm>
-      </p:grpSpPr>
-      <p:sp>
-        <p:nvSpPr>
-          <p:cNvPr id="2" name="Slide Image Placeholder 1"/>
-          <p:cNvSpPr>
-            <a:spLocks noGrp="1" noRot="1" noChangeAspect="1"/>
-          </p:cNvSpPr>
-          <p:nvPr>
-            <p:ph type="sldImg"/>
-          </p:nvPr>
-        </p:nvSpPr>
-        <p:spPr>
-          <a:xfrm>
-            <a:off x="1200150" y="1143000"/>
-            <a:ext cx="4457700" cy="3086100"/>
-          </a:xfrm>
-        </p:spPr>
-      </p:sp>
-      <p:sp>
-        <p:nvSpPr>
-          <p:cNvPr id="3" name="Notes Placeholder 2"/>
-          <p:cNvSpPr>
-            <a:spLocks noGrp="1"/>
-          </p:cNvSpPr>
-          <p:nvPr>
-            <p:ph type="body" idx="1"/>
-          </p:nvPr>
-        </p:nvSpPr>
-        <p:spPr/>
-        <p:txBody>
-          <a:bodyPr/>
-          <a:lstStyle/>
-          <a:p>
-            <a:r>
-              <a:rPr lang="en-US" dirty="0"/>
-              <a:t>A</a:t>
-            </a:r>
-            <a:r>
-              <a:rPr lang="en-US" baseline="0" dirty="0"/>
-              <a:t> speaker note on </a:t>
-            </a:r>
-            <a:r>
-              <a:rPr lang="en-US" baseline="0"/>
-              <a:t>this slide too.</a:t>
-            </a:r>
-            <a:endParaRPr lang="en-US"/>
-          </a:p>
-        </p:txBody>
-      </p:sp>
-      <p:sp>
-        <p:nvSpPr>
-          <p:cNvPr id="4" name="Slide Number Placeholder 3"/>
-          <p:cNvSpPr>
-            <a:spLocks noGrp="1"/>
-          </p:cNvSpPr>
-          <p:nvPr>
-            <p:ph type="sldNum" sz="quarter" idx="10"/>
-          </p:nvPr>
-        </p:nvSpPr>
-        <p:spPr/>
-        <p:txBody>
-          <a:bodyPr/>
-          <a:lstStyle/>
-          <a:p>
-            <a:fld id="{18BDFEC3-8487-43E8-A154-7C12CBC1FFF2}" type="slidenum">
-              <a:rPr lang="en-US" smtClean="0"/>
-              <a:t>2</a:t>
-            </a:fld>
-            <a:endParaRPr lang="en-US"/>
-          </a:p>
-        </p:txBody>
-      </p:sp>
-    </p:spTree>
-    <p:extLst>
-      <p:ext uri="{BB962C8B-B14F-4D97-AF65-F5344CB8AC3E}">
-        <p14:creationId xmlns:p14="http://schemas.microsoft.com/office/powerpoint/2010/main" val="3016900036"/>
-      </p:ext>
-    </p:extLst>
-  </p:cSld>
-  <p:clrMapOvr>
-    <a:masterClrMapping/>
-  </p:clrMapOvr>
-</p:notes>
-</file>
-
 <file path=ppt/slideLayouts/slideLayout1.xml><?xml version="1.0" encoding="utf-8"?>
 <p:sldLayout xmlns:a="http://schemas.openxmlformats.org/drawingml/2006/main" xmlns:r="http://schemas.openxmlformats.org/officeDocument/2006/relationships" xmlns:p="http://schemas.openxmlformats.org/presentationml/2006/main" type="title" preserve="1">
   <p:cSld name="Title Slide">
@@ -704,7 +497,13 @@
       </p:grpSpPr>
       <p:sp>
         <p:nvSpPr>
-          <p:cNvPr id="2" name="Title 1"/>
+          <p:cNvPr id="2" name="Title 1">
+            <a:extLst>
+              <a:ext uri="{FF2B5EF4-FFF2-40B4-BE49-F238E27FC236}">
+                <a16:creationId xmlns:a16="http://schemas.microsoft.com/office/drawing/2014/main" id="{63D5AE47-F507-4AB6-904D-574120158929}"/>
+              </a:ext>
+            </a:extLst>
+          </p:cNvPr>
           <p:cNvSpPr>
             <a:spLocks noGrp="1"/>
           </p:cNvSpPr>
@@ -714,29 +513,36 @@
         </p:nvSpPr>
         <p:spPr>
           <a:xfrm>
-            <a:off x="742950" y="1122363"/>
-            <a:ext cx="8420100" cy="2387600"/>
+            <a:off x="1524000" y="1122363"/>
+            <a:ext cx="9144000" cy="2387600"/>
           </a:xfrm>
         </p:spPr>
         <p:txBody>
-          <a:bodyPr anchor="b"/>
+          <a:bodyPr anchor="b">
+            <a:normAutofit/>
+          </a:bodyPr>
           <a:lstStyle>
             <a:lvl1pPr algn="ctr">
-              <a:defRPr sz="6000"/>
+              <a:defRPr sz="5600"/>
             </a:lvl1pPr>
           </a:lstStyle>
           <a:p>
             <a:r>
-              <a:rPr lang="en-US"/>
+              <a:rPr lang="en-US" dirty="0"/>
               <a:t>Click to edit Master title style</a:t>
             </a:r>
-            <a:endParaRPr lang="en-US" dirty="0"/>
-          </a:p>
-        </p:txBody>
-      </p:sp>
-      <p:sp>
-        <p:nvSpPr>
-          <p:cNvPr id="3" name="Subtitle 2"/>
+          </a:p>
+        </p:txBody>
+      </p:sp>
+      <p:sp>
+        <p:nvSpPr>
+          <p:cNvPr id="3" name="Subtitle 2">
+            <a:extLst>
+              <a:ext uri="{FF2B5EF4-FFF2-40B4-BE49-F238E27FC236}">
+                <a16:creationId xmlns:a16="http://schemas.microsoft.com/office/drawing/2014/main" id="{520A652D-A4B4-4986-BF2E-683BD4B49BC1}"/>
+              </a:ext>
+            </a:extLst>
+          </p:cNvPr>
           <p:cNvSpPr>
             <a:spLocks noGrp="1"/>
           </p:cNvSpPr>
@@ -746,16 +552,18 @@
         </p:nvSpPr>
         <p:spPr>
           <a:xfrm>
-            <a:off x="1238250" y="3602038"/>
-            <a:ext cx="7429500" cy="1655762"/>
+            <a:off x="1524000" y="3602038"/>
+            <a:ext cx="9144000" cy="1655762"/>
           </a:xfrm>
         </p:spPr>
         <p:txBody>
-          <a:bodyPr/>
+          <a:bodyPr>
+            <a:normAutofit/>
+          </a:bodyPr>
           <a:lstStyle>
             <a:lvl1pPr marL="0" indent="0" algn="ctr">
               <a:buNone/>
-              <a:defRPr sz="2400"/>
+              <a:defRPr sz="2800"/>
             </a:lvl1pPr>
             <a:lvl2pPr marL="457200" indent="0" algn="ctr">
               <a:buNone/>
@@ -792,16 +600,21 @@
           </a:lstStyle>
           <a:p>
             <a:r>
-              <a:rPr lang="en-US"/>
+              <a:rPr lang="en-US" dirty="0"/>
               <a:t>Click to edit Master subtitle style</a:t>
             </a:r>
-            <a:endParaRPr lang="en-US" dirty="0"/>
-          </a:p>
-        </p:txBody>
-      </p:sp>
-      <p:sp>
-        <p:nvSpPr>
-          <p:cNvPr id="4" name="Date Placeholder 3"/>
+          </a:p>
+        </p:txBody>
+      </p:sp>
+      <p:sp>
+        <p:nvSpPr>
+          <p:cNvPr id="4" name="Date Placeholder 3">
+            <a:extLst>
+              <a:ext uri="{FF2B5EF4-FFF2-40B4-BE49-F238E27FC236}">
+                <a16:creationId xmlns:a16="http://schemas.microsoft.com/office/drawing/2014/main" id="{92A775DE-DD65-4586-9C9E-A2E77923FF6C}"/>
+              </a:ext>
+            </a:extLst>
+          </p:cNvPr>
           <p:cNvSpPr>
             <a:spLocks noGrp="1"/>
           </p:cNvSpPr>
@@ -824,7 +637,13 @@
       </p:sp>
       <p:sp>
         <p:nvSpPr>
-          <p:cNvPr id="5" name="Footer Placeholder 4"/>
+          <p:cNvPr id="5" name="Footer Placeholder 4">
+            <a:extLst>
+              <a:ext uri="{FF2B5EF4-FFF2-40B4-BE49-F238E27FC236}">
+                <a16:creationId xmlns:a16="http://schemas.microsoft.com/office/drawing/2014/main" id="{D9DFE575-6163-4121-A4A2-42B4F79D5385}"/>
+              </a:ext>
+            </a:extLst>
+          </p:cNvPr>
           <p:cNvSpPr>
             <a:spLocks noGrp="1"/>
           </p:cNvSpPr>
@@ -843,7 +662,13 @@
       </p:sp>
       <p:sp>
         <p:nvSpPr>
-          <p:cNvPr id="6" name="Slide Number Placeholder 5"/>
+          <p:cNvPr id="6" name="Slide Number Placeholder 5">
+            <a:extLst>
+              <a:ext uri="{FF2B5EF4-FFF2-40B4-BE49-F238E27FC236}">
+                <a16:creationId xmlns:a16="http://schemas.microsoft.com/office/drawing/2014/main" id="{78E656B9-D885-4DB2-B241-4193A414898F}"/>
+              </a:ext>
+            </a:extLst>
+          </p:cNvPr>
           <p:cNvSpPr>
             <a:spLocks noGrp="1"/>
           </p:cNvSpPr>
@@ -867,7 +692,7 @@
     </p:spTree>
     <p:extLst>
       <p:ext uri="{BB962C8B-B14F-4D97-AF65-F5344CB8AC3E}">
-        <p14:creationId xmlns:p14="http://schemas.microsoft.com/office/powerpoint/2010/main" val="1490408290"/>
+        <p14:creationId xmlns:p14="http://schemas.microsoft.com/office/powerpoint/2010/main" val="376817045"/>
       </p:ext>
     </p:extLst>
   </p:cSld>
@@ -896,7 +721,13 @@
       </p:grpSpPr>
       <p:sp>
         <p:nvSpPr>
-          <p:cNvPr id="2" name="Title 1"/>
+          <p:cNvPr id="2" name="Title 1">
+            <a:extLst>
+              <a:ext uri="{FF2B5EF4-FFF2-40B4-BE49-F238E27FC236}">
+                <a16:creationId xmlns:a16="http://schemas.microsoft.com/office/drawing/2014/main" id="{B4F7CDDB-CB28-4455-B5E5-441ECA3F25F4}"/>
+              </a:ext>
+            </a:extLst>
+          </p:cNvPr>
           <p:cNvSpPr>
             <a:spLocks noGrp="1"/>
           </p:cNvSpPr>
@@ -913,13 +744,18 @@
               <a:rPr lang="en-US"/>
               <a:t>Click to edit Master title style</a:t>
             </a:r>
-            <a:endParaRPr lang="en-US" dirty="0"/>
-          </a:p>
-        </p:txBody>
-      </p:sp>
-      <p:sp>
-        <p:nvSpPr>
-          <p:cNvPr id="3" name="Vertical Text Placeholder 2"/>
+          </a:p>
+        </p:txBody>
+      </p:sp>
+      <p:sp>
+        <p:nvSpPr>
+          <p:cNvPr id="3" name="Vertical Text Placeholder 2">
+            <a:extLst>
+              <a:ext uri="{FF2B5EF4-FFF2-40B4-BE49-F238E27FC236}">
+                <a16:creationId xmlns:a16="http://schemas.microsoft.com/office/drawing/2014/main" id="{537A25D8-E46F-4469-B17A-FAA1473C7442}"/>
+              </a:ext>
+            </a:extLst>
+          </p:cNvPr>
           <p:cNvSpPr>
             <a:spLocks noGrp="1"/>
           </p:cNvSpPr>
@@ -965,13 +801,18 @@
               <a:rPr lang="en-US"/>
               <a:t>Fifth level</a:t>
             </a:r>
-            <a:endParaRPr lang="en-US" dirty="0"/>
-          </a:p>
-        </p:txBody>
-      </p:sp>
-      <p:sp>
-        <p:nvSpPr>
-          <p:cNvPr id="4" name="Date Placeholder 3"/>
+          </a:p>
+        </p:txBody>
+      </p:sp>
+      <p:sp>
+        <p:nvSpPr>
+          <p:cNvPr id="4" name="Date Placeholder 3">
+            <a:extLst>
+              <a:ext uri="{FF2B5EF4-FFF2-40B4-BE49-F238E27FC236}">
+                <a16:creationId xmlns:a16="http://schemas.microsoft.com/office/drawing/2014/main" id="{128C39CF-0ED4-4C3F-BE0A-3DD13203D0AF}"/>
+              </a:ext>
+            </a:extLst>
+          </p:cNvPr>
           <p:cNvSpPr>
             <a:spLocks noGrp="1"/>
           </p:cNvSpPr>
@@ -994,7 +835,13 @@
       </p:sp>
       <p:sp>
         <p:nvSpPr>
-          <p:cNvPr id="5" name="Footer Placeholder 4"/>
+          <p:cNvPr id="5" name="Footer Placeholder 4">
+            <a:extLst>
+              <a:ext uri="{FF2B5EF4-FFF2-40B4-BE49-F238E27FC236}">
+                <a16:creationId xmlns:a16="http://schemas.microsoft.com/office/drawing/2014/main" id="{928ED3F7-026F-48D1-A051-E76312D2992C}"/>
+              </a:ext>
+            </a:extLst>
+          </p:cNvPr>
           <p:cNvSpPr>
             <a:spLocks noGrp="1"/>
           </p:cNvSpPr>
@@ -1013,7 +860,13 @@
       </p:sp>
       <p:sp>
         <p:nvSpPr>
-          <p:cNvPr id="6" name="Slide Number Placeholder 5"/>
+          <p:cNvPr id="6" name="Slide Number Placeholder 5">
+            <a:extLst>
+              <a:ext uri="{FF2B5EF4-FFF2-40B4-BE49-F238E27FC236}">
+                <a16:creationId xmlns:a16="http://schemas.microsoft.com/office/drawing/2014/main" id="{4D0E73E4-A99C-4D53-B4E9-5055439886AA}"/>
+              </a:ext>
+            </a:extLst>
+          </p:cNvPr>
           <p:cNvSpPr>
             <a:spLocks noGrp="1"/>
           </p:cNvSpPr>
@@ -1037,7 +890,7 @@
     </p:spTree>
     <p:extLst>
       <p:ext uri="{BB962C8B-B14F-4D97-AF65-F5344CB8AC3E}">
-        <p14:creationId xmlns:p14="http://schemas.microsoft.com/office/powerpoint/2010/main" val="1160897250"/>
+        <p14:creationId xmlns:p14="http://schemas.microsoft.com/office/powerpoint/2010/main" val="4092025272"/>
       </p:ext>
     </p:extLst>
   </p:cSld>
@@ -1066,7 +919,13 @@
       </p:grpSpPr>
       <p:sp>
         <p:nvSpPr>
-          <p:cNvPr id="2" name="Vertical Title 1"/>
+          <p:cNvPr id="2" name="Vertical Title 1">
+            <a:extLst>
+              <a:ext uri="{FF2B5EF4-FFF2-40B4-BE49-F238E27FC236}">
+                <a16:creationId xmlns:a16="http://schemas.microsoft.com/office/drawing/2014/main" id="{E1CC3756-25BD-47EB-8D44-9B2F4C65E32E}"/>
+              </a:ext>
+            </a:extLst>
+          </p:cNvPr>
           <p:cNvSpPr>
             <a:spLocks noGrp="1"/>
           </p:cNvSpPr>
@@ -1076,8 +935,8 @@
         </p:nvSpPr>
         <p:spPr>
           <a:xfrm>
-            <a:off x="7088982" y="365125"/>
-            <a:ext cx="2135981" cy="5811838"/>
+            <a:off x="8724900" y="365125"/>
+            <a:ext cx="2628900" cy="5811838"/>
           </a:xfrm>
         </p:spPr>
         <p:txBody>
@@ -1088,13 +947,18 @@
               <a:rPr lang="en-US"/>
               <a:t>Click to edit Master title style</a:t>
             </a:r>
-            <a:endParaRPr lang="en-US" dirty="0"/>
-          </a:p>
-        </p:txBody>
-      </p:sp>
-      <p:sp>
-        <p:nvSpPr>
-          <p:cNvPr id="3" name="Vertical Text Placeholder 2"/>
+          </a:p>
+        </p:txBody>
+      </p:sp>
+      <p:sp>
+        <p:nvSpPr>
+          <p:cNvPr id="3" name="Vertical Text Placeholder 2">
+            <a:extLst>
+              <a:ext uri="{FF2B5EF4-FFF2-40B4-BE49-F238E27FC236}">
+                <a16:creationId xmlns:a16="http://schemas.microsoft.com/office/drawing/2014/main" id="{E12B8429-9E1A-45F2-8949-17502FE5F4D3}"/>
+              </a:ext>
+            </a:extLst>
+          </p:cNvPr>
           <p:cNvSpPr>
             <a:spLocks noGrp="1"/>
           </p:cNvSpPr>
@@ -1104,8 +968,8 @@
         </p:nvSpPr>
         <p:spPr>
           <a:xfrm>
-            <a:off x="681038" y="365125"/>
-            <a:ext cx="6284119" cy="5811838"/>
+            <a:off x="838200" y="365125"/>
+            <a:ext cx="7734300" cy="5811838"/>
           </a:xfrm>
         </p:spPr>
         <p:txBody>
@@ -1145,13 +1009,18 @@
               <a:rPr lang="en-US"/>
               <a:t>Fifth level</a:t>
             </a:r>
-            <a:endParaRPr lang="en-US" dirty="0"/>
-          </a:p>
-        </p:txBody>
-      </p:sp>
-      <p:sp>
-        <p:nvSpPr>
-          <p:cNvPr id="4" name="Date Placeholder 3"/>
+          </a:p>
+        </p:txBody>
+      </p:sp>
+      <p:sp>
+        <p:nvSpPr>
+          <p:cNvPr id="4" name="Date Placeholder 3">
+            <a:extLst>
+              <a:ext uri="{FF2B5EF4-FFF2-40B4-BE49-F238E27FC236}">
+                <a16:creationId xmlns:a16="http://schemas.microsoft.com/office/drawing/2014/main" id="{63817AB1-DAB0-40F3-A60D-9ECBAA9D82C5}"/>
+              </a:ext>
+            </a:extLst>
+          </p:cNvPr>
           <p:cNvSpPr>
             <a:spLocks noGrp="1"/>
           </p:cNvSpPr>
@@ -1174,7 +1043,13 @@
       </p:sp>
       <p:sp>
         <p:nvSpPr>
-          <p:cNvPr id="5" name="Footer Placeholder 4"/>
+          <p:cNvPr id="5" name="Footer Placeholder 4">
+            <a:extLst>
+              <a:ext uri="{FF2B5EF4-FFF2-40B4-BE49-F238E27FC236}">
+                <a16:creationId xmlns:a16="http://schemas.microsoft.com/office/drawing/2014/main" id="{F48835C1-5807-48EC-8AE5-CA63AB3D44B7}"/>
+              </a:ext>
+            </a:extLst>
+          </p:cNvPr>
           <p:cNvSpPr>
             <a:spLocks noGrp="1"/>
           </p:cNvSpPr>
@@ -1193,7 +1068,13 @@
       </p:sp>
       <p:sp>
         <p:nvSpPr>
-          <p:cNvPr id="6" name="Slide Number Placeholder 5"/>
+          <p:cNvPr id="6" name="Slide Number Placeholder 5">
+            <a:extLst>
+              <a:ext uri="{FF2B5EF4-FFF2-40B4-BE49-F238E27FC236}">
+                <a16:creationId xmlns:a16="http://schemas.microsoft.com/office/drawing/2014/main" id="{13AFD1C9-9F52-4FD4-89C1-BE4076D6B8CF}"/>
+              </a:ext>
+            </a:extLst>
+          </p:cNvPr>
           <p:cNvSpPr>
             <a:spLocks noGrp="1"/>
           </p:cNvSpPr>
@@ -1217,7 +1098,7 @@
     </p:spTree>
     <p:extLst>
       <p:ext uri="{BB962C8B-B14F-4D97-AF65-F5344CB8AC3E}">
-        <p14:creationId xmlns:p14="http://schemas.microsoft.com/office/powerpoint/2010/main" val="3926694169"/>
+        <p14:creationId xmlns:p14="http://schemas.microsoft.com/office/powerpoint/2010/main" val="1795074371"/>
       </p:ext>
     </p:extLst>
   </p:cSld>
@@ -1246,7 +1127,13 @@
       </p:grpSpPr>
       <p:sp>
         <p:nvSpPr>
-          <p:cNvPr id="2" name="Title 1"/>
+          <p:cNvPr id="2" name="Title 1">
+            <a:extLst>
+              <a:ext uri="{FF2B5EF4-FFF2-40B4-BE49-F238E27FC236}">
+                <a16:creationId xmlns:a16="http://schemas.microsoft.com/office/drawing/2014/main" id="{B9171DC7-83DC-4812-B6D6-720FD0903317}"/>
+              </a:ext>
+            </a:extLst>
+          </p:cNvPr>
           <p:cNvSpPr>
             <a:spLocks noGrp="1"/>
           </p:cNvSpPr>
@@ -1263,13 +1150,18 @@
               <a:rPr lang="en-US"/>
               <a:t>Click to edit Master title style</a:t>
             </a:r>
-            <a:endParaRPr lang="en-US" dirty="0"/>
-          </a:p>
-        </p:txBody>
-      </p:sp>
-      <p:sp>
-        <p:nvSpPr>
-          <p:cNvPr id="3" name="Content Placeholder 2"/>
+          </a:p>
+        </p:txBody>
+      </p:sp>
+      <p:sp>
+        <p:nvSpPr>
+          <p:cNvPr id="3" name="Content Placeholder 2">
+            <a:extLst>
+              <a:ext uri="{FF2B5EF4-FFF2-40B4-BE49-F238E27FC236}">
+                <a16:creationId xmlns:a16="http://schemas.microsoft.com/office/drawing/2014/main" id="{E3951675-2757-4186-87D6-120677EA8D01}"/>
+              </a:ext>
+            </a:extLst>
+          </p:cNvPr>
           <p:cNvSpPr>
             <a:spLocks noGrp="1"/>
           </p:cNvSpPr>
@@ -1315,13 +1207,18 @@
               <a:rPr lang="en-US"/>
               <a:t>Fifth level</a:t>
             </a:r>
-            <a:endParaRPr lang="en-US" dirty="0"/>
-          </a:p>
-        </p:txBody>
-      </p:sp>
-      <p:sp>
-        <p:nvSpPr>
-          <p:cNvPr id="4" name="Date Placeholder 3"/>
+          </a:p>
+        </p:txBody>
+      </p:sp>
+      <p:sp>
+        <p:nvSpPr>
+          <p:cNvPr id="4" name="Date Placeholder 3">
+            <a:extLst>
+              <a:ext uri="{FF2B5EF4-FFF2-40B4-BE49-F238E27FC236}">
+                <a16:creationId xmlns:a16="http://schemas.microsoft.com/office/drawing/2014/main" id="{B98ECA6F-F439-442D-A62D-E7419D910852}"/>
+              </a:ext>
+            </a:extLst>
+          </p:cNvPr>
           <p:cNvSpPr>
             <a:spLocks noGrp="1"/>
           </p:cNvSpPr>
@@ -1344,7 +1241,13 @@
       </p:sp>
       <p:sp>
         <p:nvSpPr>
-          <p:cNvPr id="5" name="Footer Placeholder 4"/>
+          <p:cNvPr id="5" name="Footer Placeholder 4">
+            <a:extLst>
+              <a:ext uri="{FF2B5EF4-FFF2-40B4-BE49-F238E27FC236}">
+                <a16:creationId xmlns:a16="http://schemas.microsoft.com/office/drawing/2014/main" id="{8548F014-A5FD-40FA-8C08-D69D78CCD149}"/>
+              </a:ext>
+            </a:extLst>
+          </p:cNvPr>
           <p:cNvSpPr>
             <a:spLocks noGrp="1"/>
           </p:cNvSpPr>
@@ -1363,7 +1266,13 @@
       </p:sp>
       <p:sp>
         <p:nvSpPr>
-          <p:cNvPr id="6" name="Slide Number Placeholder 5"/>
+          <p:cNvPr id="6" name="Slide Number Placeholder 5">
+            <a:extLst>
+              <a:ext uri="{FF2B5EF4-FFF2-40B4-BE49-F238E27FC236}">
+                <a16:creationId xmlns:a16="http://schemas.microsoft.com/office/drawing/2014/main" id="{955B4537-72BE-4221-B7A6-6A4E55292F8C}"/>
+              </a:ext>
+            </a:extLst>
+          </p:cNvPr>
           <p:cNvSpPr>
             <a:spLocks noGrp="1"/>
           </p:cNvSpPr>
@@ -1387,7 +1296,7 @@
     </p:spTree>
     <p:extLst>
       <p:ext uri="{BB962C8B-B14F-4D97-AF65-F5344CB8AC3E}">
-        <p14:creationId xmlns:p14="http://schemas.microsoft.com/office/powerpoint/2010/main" val="1686305239"/>
+        <p14:creationId xmlns:p14="http://schemas.microsoft.com/office/powerpoint/2010/main" val="1902533375"/>
       </p:ext>
     </p:extLst>
   </p:cSld>
@@ -1416,7 +1325,13 @@
       </p:grpSpPr>
       <p:sp>
         <p:nvSpPr>
-          <p:cNvPr id="2" name="Title 1"/>
+          <p:cNvPr id="2" name="Title 1">
+            <a:extLst>
+              <a:ext uri="{FF2B5EF4-FFF2-40B4-BE49-F238E27FC236}">
+                <a16:creationId xmlns:a16="http://schemas.microsoft.com/office/drawing/2014/main" id="{A961E8F3-2071-45E9-B9B2-2CC1494E6117}"/>
+              </a:ext>
+            </a:extLst>
+          </p:cNvPr>
           <p:cNvSpPr>
             <a:spLocks noGrp="1"/>
           </p:cNvSpPr>
@@ -1426,29 +1341,36 @@
         </p:nvSpPr>
         <p:spPr>
           <a:xfrm>
-            <a:off x="675879" y="1709740"/>
-            <a:ext cx="8543925" cy="2852737"/>
+            <a:off x="831850" y="1709738"/>
+            <a:ext cx="10515600" cy="2852737"/>
           </a:xfrm>
         </p:spPr>
         <p:txBody>
-          <a:bodyPr anchor="b"/>
+          <a:bodyPr anchor="b">
+            <a:normAutofit/>
+          </a:bodyPr>
           <a:lstStyle>
             <a:lvl1pPr>
-              <a:defRPr sz="6000"/>
+              <a:defRPr sz="5600"/>
             </a:lvl1pPr>
           </a:lstStyle>
           <a:p>
             <a:r>
-              <a:rPr lang="en-US"/>
+              <a:rPr lang="en-US" dirty="0"/>
               <a:t>Click to edit Master title style</a:t>
             </a:r>
-            <a:endParaRPr lang="en-US" dirty="0"/>
-          </a:p>
-        </p:txBody>
-      </p:sp>
-      <p:sp>
-        <p:nvSpPr>
-          <p:cNvPr id="3" name="Text Placeholder 2"/>
+          </a:p>
+        </p:txBody>
+      </p:sp>
+      <p:sp>
+        <p:nvSpPr>
+          <p:cNvPr id="3" name="Text Placeholder 2">
+            <a:extLst>
+              <a:ext uri="{FF2B5EF4-FFF2-40B4-BE49-F238E27FC236}">
+                <a16:creationId xmlns:a16="http://schemas.microsoft.com/office/drawing/2014/main" id="{2A43B615-C304-4BEE-8040-200808965FEE}"/>
+              </a:ext>
+            </a:extLst>
+          </p:cNvPr>
           <p:cNvSpPr>
             <a:spLocks noGrp="1"/>
           </p:cNvSpPr>
@@ -1458,8 +1380,8 @@
         </p:nvSpPr>
         <p:spPr>
           <a:xfrm>
-            <a:off x="675879" y="4589465"/>
-            <a:ext cx="8543925" cy="1500187"/>
+            <a:off x="831850" y="4589463"/>
+            <a:ext cx="10515600" cy="1500187"/>
           </a:xfrm>
         </p:spPr>
         <p:txBody>
@@ -1469,7 +1391,9 @@
               <a:buNone/>
               <a:defRPr sz="2400">
                 <a:solidFill>
-                  <a:schemeClr val="tx1"/>
+                  <a:schemeClr val="tx1">
+                    <a:tint val="75000"/>
+                  </a:schemeClr>
                 </a:solidFill>
               </a:defRPr>
             </a:lvl1pPr>
@@ -1565,7 +1489,13 @@
       </p:sp>
       <p:sp>
         <p:nvSpPr>
-          <p:cNvPr id="4" name="Date Placeholder 3"/>
+          <p:cNvPr id="4" name="Date Placeholder 3">
+            <a:extLst>
+              <a:ext uri="{FF2B5EF4-FFF2-40B4-BE49-F238E27FC236}">
+                <a16:creationId xmlns:a16="http://schemas.microsoft.com/office/drawing/2014/main" id="{2635C89E-A870-4383-8233-061146DB2A0F}"/>
+              </a:ext>
+            </a:extLst>
+          </p:cNvPr>
           <p:cNvSpPr>
             <a:spLocks noGrp="1"/>
           </p:cNvSpPr>
@@ -1588,7 +1518,13 @@
       </p:sp>
       <p:sp>
         <p:nvSpPr>
-          <p:cNvPr id="5" name="Footer Placeholder 4"/>
+          <p:cNvPr id="5" name="Footer Placeholder 4">
+            <a:extLst>
+              <a:ext uri="{FF2B5EF4-FFF2-40B4-BE49-F238E27FC236}">
+                <a16:creationId xmlns:a16="http://schemas.microsoft.com/office/drawing/2014/main" id="{C5224EE9-F20D-42C4-A1D8-624DEB5E7EBE}"/>
+              </a:ext>
+            </a:extLst>
+          </p:cNvPr>
           <p:cNvSpPr>
             <a:spLocks noGrp="1"/>
           </p:cNvSpPr>
@@ -1607,7 +1543,13 @@
       </p:sp>
       <p:sp>
         <p:nvSpPr>
-          <p:cNvPr id="6" name="Slide Number Placeholder 5"/>
+          <p:cNvPr id="6" name="Slide Number Placeholder 5">
+            <a:extLst>
+              <a:ext uri="{FF2B5EF4-FFF2-40B4-BE49-F238E27FC236}">
+                <a16:creationId xmlns:a16="http://schemas.microsoft.com/office/drawing/2014/main" id="{F5125C34-800A-4420-AD75-DB546ECE5A8A}"/>
+              </a:ext>
+            </a:extLst>
+          </p:cNvPr>
           <p:cNvSpPr>
             <a:spLocks noGrp="1"/>
           </p:cNvSpPr>
@@ -1631,7 +1573,7 @@
     </p:spTree>
     <p:extLst>
       <p:ext uri="{BB962C8B-B14F-4D97-AF65-F5344CB8AC3E}">
-        <p14:creationId xmlns:p14="http://schemas.microsoft.com/office/powerpoint/2010/main" val="2597356551"/>
+        <p14:creationId xmlns:p14="http://schemas.microsoft.com/office/powerpoint/2010/main" val="3605277737"/>
       </p:ext>
     </p:extLst>
   </p:cSld>
@@ -1660,7 +1602,13 @@
       </p:grpSpPr>
       <p:sp>
         <p:nvSpPr>
-          <p:cNvPr id="2" name="Title 1"/>
+          <p:cNvPr id="2" name="Title 1">
+            <a:extLst>
+              <a:ext uri="{FF2B5EF4-FFF2-40B4-BE49-F238E27FC236}">
+                <a16:creationId xmlns:a16="http://schemas.microsoft.com/office/drawing/2014/main" id="{8FA67AE7-09A9-4B08-9AC7-ACF4AA27F4E8}"/>
+              </a:ext>
+            </a:extLst>
+          </p:cNvPr>
           <p:cNvSpPr>
             <a:spLocks noGrp="1"/>
           </p:cNvSpPr>
@@ -1677,13 +1625,18 @@
               <a:rPr lang="en-US"/>
               <a:t>Click to edit Master title style</a:t>
             </a:r>
-            <a:endParaRPr lang="en-US" dirty="0"/>
-          </a:p>
-        </p:txBody>
-      </p:sp>
-      <p:sp>
-        <p:nvSpPr>
-          <p:cNvPr id="3" name="Content Placeholder 2"/>
+          </a:p>
+        </p:txBody>
+      </p:sp>
+      <p:sp>
+        <p:nvSpPr>
+          <p:cNvPr id="3" name="Content Placeholder 2">
+            <a:extLst>
+              <a:ext uri="{FF2B5EF4-FFF2-40B4-BE49-F238E27FC236}">
+                <a16:creationId xmlns:a16="http://schemas.microsoft.com/office/drawing/2014/main" id="{30562C5E-AF75-4123-AB7E-D8D16EF489FB}"/>
+              </a:ext>
+            </a:extLst>
+          </p:cNvPr>
           <p:cNvSpPr>
             <a:spLocks noGrp="1"/>
           </p:cNvSpPr>
@@ -1693,8 +1646,8 @@
         </p:nvSpPr>
         <p:spPr>
           <a:xfrm>
-            <a:off x="681038" y="1825625"/>
-            <a:ext cx="4210050" cy="4351338"/>
+            <a:off x="838200" y="1825625"/>
+            <a:ext cx="5181600" cy="4351338"/>
           </a:xfrm>
         </p:spPr>
         <p:txBody>
@@ -1734,13 +1687,18 @@
               <a:rPr lang="en-US"/>
               <a:t>Fifth level</a:t>
             </a:r>
-            <a:endParaRPr lang="en-US" dirty="0"/>
-          </a:p>
-        </p:txBody>
-      </p:sp>
-      <p:sp>
-        <p:nvSpPr>
-          <p:cNvPr id="4" name="Content Placeholder 3"/>
+          </a:p>
+        </p:txBody>
+      </p:sp>
+      <p:sp>
+        <p:nvSpPr>
+          <p:cNvPr id="4" name="Content Placeholder 3">
+            <a:extLst>
+              <a:ext uri="{FF2B5EF4-FFF2-40B4-BE49-F238E27FC236}">
+                <a16:creationId xmlns:a16="http://schemas.microsoft.com/office/drawing/2014/main" id="{40B188F2-6F1C-49CD-A317-9B0AC4817E25}"/>
+              </a:ext>
+            </a:extLst>
+          </p:cNvPr>
           <p:cNvSpPr>
             <a:spLocks noGrp="1"/>
           </p:cNvSpPr>
@@ -1750,8 +1708,8 @@
         </p:nvSpPr>
         <p:spPr>
           <a:xfrm>
-            <a:off x="5014913" y="1825625"/>
-            <a:ext cx="4210050" cy="4351338"/>
+            <a:off x="6172200" y="1825625"/>
+            <a:ext cx="5181600" cy="4351338"/>
           </a:xfrm>
         </p:spPr>
         <p:txBody>
@@ -1791,13 +1749,18 @@
               <a:rPr lang="en-US"/>
               <a:t>Fifth level</a:t>
             </a:r>
-            <a:endParaRPr lang="en-US" dirty="0"/>
-          </a:p>
-        </p:txBody>
-      </p:sp>
-      <p:sp>
-        <p:nvSpPr>
-          <p:cNvPr id="5" name="Date Placeholder 4"/>
+          </a:p>
+        </p:txBody>
+      </p:sp>
+      <p:sp>
+        <p:nvSpPr>
+          <p:cNvPr id="5" name="Date Placeholder 4">
+            <a:extLst>
+              <a:ext uri="{FF2B5EF4-FFF2-40B4-BE49-F238E27FC236}">
+                <a16:creationId xmlns:a16="http://schemas.microsoft.com/office/drawing/2014/main" id="{6CED3390-50E3-4391-8759-C89FECB8C85C}"/>
+              </a:ext>
+            </a:extLst>
+          </p:cNvPr>
           <p:cNvSpPr>
             <a:spLocks noGrp="1"/>
           </p:cNvSpPr>
@@ -1820,7 +1783,13 @@
       </p:sp>
       <p:sp>
         <p:nvSpPr>
-          <p:cNvPr id="6" name="Footer Placeholder 5"/>
+          <p:cNvPr id="6" name="Footer Placeholder 5">
+            <a:extLst>
+              <a:ext uri="{FF2B5EF4-FFF2-40B4-BE49-F238E27FC236}">
+                <a16:creationId xmlns:a16="http://schemas.microsoft.com/office/drawing/2014/main" id="{10FA13AA-8817-4FFB-BC89-E1A0004E47A9}"/>
+              </a:ext>
+            </a:extLst>
+          </p:cNvPr>
           <p:cNvSpPr>
             <a:spLocks noGrp="1"/>
           </p:cNvSpPr>
@@ -1839,7 +1808,13 @@
       </p:sp>
       <p:sp>
         <p:nvSpPr>
-          <p:cNvPr id="7" name="Slide Number Placeholder 6"/>
+          <p:cNvPr id="7" name="Slide Number Placeholder 6">
+            <a:extLst>
+              <a:ext uri="{FF2B5EF4-FFF2-40B4-BE49-F238E27FC236}">
+                <a16:creationId xmlns:a16="http://schemas.microsoft.com/office/drawing/2014/main" id="{88CC5D21-FEFB-41EB-A3D7-361B887340A7}"/>
+              </a:ext>
+            </a:extLst>
+          </p:cNvPr>
           <p:cNvSpPr>
             <a:spLocks noGrp="1"/>
           </p:cNvSpPr>
@@ -1863,7 +1838,7 @@
     </p:spTree>
     <p:extLst>
       <p:ext uri="{BB962C8B-B14F-4D97-AF65-F5344CB8AC3E}">
-        <p14:creationId xmlns:p14="http://schemas.microsoft.com/office/powerpoint/2010/main" val="3994084989"/>
+        <p14:creationId xmlns:p14="http://schemas.microsoft.com/office/powerpoint/2010/main" val="858645076"/>
       </p:ext>
     </p:extLst>
   </p:cSld>
@@ -1892,7 +1867,13 @@
       </p:grpSpPr>
       <p:sp>
         <p:nvSpPr>
-          <p:cNvPr id="2" name="Title 1"/>
+          <p:cNvPr id="2" name="Title 1">
+            <a:extLst>
+              <a:ext uri="{FF2B5EF4-FFF2-40B4-BE49-F238E27FC236}">
+                <a16:creationId xmlns:a16="http://schemas.microsoft.com/office/drawing/2014/main" id="{687D711A-945D-4DD5-B90A-53242D05FC3D}"/>
+              </a:ext>
+            </a:extLst>
+          </p:cNvPr>
           <p:cNvSpPr>
             <a:spLocks noGrp="1"/>
           </p:cNvSpPr>
@@ -1902,8 +1883,8 @@
         </p:nvSpPr>
         <p:spPr>
           <a:xfrm>
-            <a:off x="682328" y="365127"/>
-            <a:ext cx="8543925" cy="1325563"/>
+            <a:off x="839788" y="365125"/>
+            <a:ext cx="10515600" cy="1325563"/>
           </a:xfrm>
         </p:spPr>
         <p:txBody>
@@ -1914,13 +1895,18 @@
               <a:rPr lang="en-US"/>
               <a:t>Click to edit Master title style</a:t>
             </a:r>
-            <a:endParaRPr lang="en-US" dirty="0"/>
-          </a:p>
-        </p:txBody>
-      </p:sp>
-      <p:sp>
-        <p:nvSpPr>
-          <p:cNvPr id="3" name="Text Placeholder 2"/>
+          </a:p>
+        </p:txBody>
+      </p:sp>
+      <p:sp>
+        <p:nvSpPr>
+          <p:cNvPr id="3" name="Text Placeholder 2">
+            <a:extLst>
+              <a:ext uri="{FF2B5EF4-FFF2-40B4-BE49-F238E27FC236}">
+                <a16:creationId xmlns:a16="http://schemas.microsoft.com/office/drawing/2014/main" id="{1CEA02F9-BF55-4844-9961-1096865B2D4E}"/>
+              </a:ext>
+            </a:extLst>
+          </p:cNvPr>
           <p:cNvSpPr>
             <a:spLocks noGrp="1"/>
           </p:cNvSpPr>
@@ -1930,8 +1916,8 @@
         </p:nvSpPr>
         <p:spPr>
           <a:xfrm>
-            <a:off x="682329" y="1681163"/>
-            <a:ext cx="4190702" cy="823912"/>
+            <a:off x="839788" y="1681163"/>
+            <a:ext cx="5157787" cy="823912"/>
           </a:xfrm>
         </p:spPr>
         <p:txBody>
@@ -1985,7 +1971,13 @@
       </p:sp>
       <p:sp>
         <p:nvSpPr>
-          <p:cNvPr id="4" name="Content Placeholder 3"/>
+          <p:cNvPr id="4" name="Content Placeholder 3">
+            <a:extLst>
+              <a:ext uri="{FF2B5EF4-FFF2-40B4-BE49-F238E27FC236}">
+                <a16:creationId xmlns:a16="http://schemas.microsoft.com/office/drawing/2014/main" id="{2E7D20DD-C8FA-42FD-80FC-F93A32C6F194}"/>
+              </a:ext>
+            </a:extLst>
+          </p:cNvPr>
           <p:cNvSpPr>
             <a:spLocks noGrp="1"/>
           </p:cNvSpPr>
@@ -1995,8 +1987,8 @@
         </p:nvSpPr>
         <p:spPr>
           <a:xfrm>
-            <a:off x="682329" y="2505075"/>
-            <a:ext cx="4190702" cy="3684588"/>
+            <a:off x="839788" y="2505075"/>
+            <a:ext cx="5157787" cy="3684588"/>
           </a:xfrm>
         </p:spPr>
         <p:txBody>
@@ -2036,13 +2028,18 @@
               <a:rPr lang="en-US"/>
               <a:t>Fifth level</a:t>
             </a:r>
-            <a:endParaRPr lang="en-US" dirty="0"/>
-          </a:p>
-        </p:txBody>
-      </p:sp>
-      <p:sp>
-        <p:nvSpPr>
-          <p:cNvPr id="5" name="Text Placeholder 4"/>
+          </a:p>
+        </p:txBody>
+      </p:sp>
+      <p:sp>
+        <p:nvSpPr>
+          <p:cNvPr id="5" name="Text Placeholder 4">
+            <a:extLst>
+              <a:ext uri="{FF2B5EF4-FFF2-40B4-BE49-F238E27FC236}">
+                <a16:creationId xmlns:a16="http://schemas.microsoft.com/office/drawing/2014/main" id="{B9B6A021-6C20-491F-A7D3-965A0B7E3074}"/>
+              </a:ext>
+            </a:extLst>
+          </p:cNvPr>
           <p:cNvSpPr>
             <a:spLocks noGrp="1"/>
           </p:cNvSpPr>
@@ -2052,8 +2049,8 @@
         </p:nvSpPr>
         <p:spPr>
           <a:xfrm>
-            <a:off x="5014913" y="1681163"/>
-            <a:ext cx="4211340" cy="823912"/>
+            <a:off x="6172200" y="1681163"/>
+            <a:ext cx="5183188" cy="823912"/>
           </a:xfrm>
         </p:spPr>
         <p:txBody>
@@ -2107,7 +2104,13 @@
       </p:sp>
       <p:sp>
         <p:nvSpPr>
-          <p:cNvPr id="6" name="Content Placeholder 5"/>
+          <p:cNvPr id="6" name="Content Placeholder 5">
+            <a:extLst>
+              <a:ext uri="{FF2B5EF4-FFF2-40B4-BE49-F238E27FC236}">
+                <a16:creationId xmlns:a16="http://schemas.microsoft.com/office/drawing/2014/main" id="{E9639124-53B6-44CE-A0AF-68AEC621D3BA}"/>
+              </a:ext>
+            </a:extLst>
+          </p:cNvPr>
           <p:cNvSpPr>
             <a:spLocks noGrp="1"/>
           </p:cNvSpPr>
@@ -2117,8 +2120,8 @@
         </p:nvSpPr>
         <p:spPr>
           <a:xfrm>
-            <a:off x="5014913" y="2505075"/>
-            <a:ext cx="4211340" cy="3684588"/>
+            <a:off x="6172200" y="2505075"/>
+            <a:ext cx="5183188" cy="3684588"/>
           </a:xfrm>
         </p:spPr>
         <p:txBody>
@@ -2158,13 +2161,18 @@
               <a:rPr lang="en-US"/>
               <a:t>Fifth level</a:t>
             </a:r>
-            <a:endParaRPr lang="en-US" dirty="0"/>
-          </a:p>
-        </p:txBody>
-      </p:sp>
-      <p:sp>
-        <p:nvSpPr>
-          <p:cNvPr id="7" name="Date Placeholder 6"/>
+          </a:p>
+        </p:txBody>
+      </p:sp>
+      <p:sp>
+        <p:nvSpPr>
+          <p:cNvPr id="7" name="Date Placeholder 6">
+            <a:extLst>
+              <a:ext uri="{FF2B5EF4-FFF2-40B4-BE49-F238E27FC236}">
+                <a16:creationId xmlns:a16="http://schemas.microsoft.com/office/drawing/2014/main" id="{791490FA-2941-4F0E-8033-93D5697F51D0}"/>
+              </a:ext>
+            </a:extLst>
+          </p:cNvPr>
           <p:cNvSpPr>
             <a:spLocks noGrp="1"/>
           </p:cNvSpPr>
@@ -2187,7 +2195,13 @@
       </p:sp>
       <p:sp>
         <p:nvSpPr>
-          <p:cNvPr id="8" name="Footer Placeholder 7"/>
+          <p:cNvPr id="8" name="Footer Placeholder 7">
+            <a:extLst>
+              <a:ext uri="{FF2B5EF4-FFF2-40B4-BE49-F238E27FC236}">
+                <a16:creationId xmlns:a16="http://schemas.microsoft.com/office/drawing/2014/main" id="{32D7C6F1-9B81-4FCD-9AA9-0BF41E93F9D5}"/>
+              </a:ext>
+            </a:extLst>
+          </p:cNvPr>
           <p:cNvSpPr>
             <a:spLocks noGrp="1"/>
           </p:cNvSpPr>
@@ -2206,7 +2220,13 @@
       </p:sp>
       <p:sp>
         <p:nvSpPr>
-          <p:cNvPr id="9" name="Slide Number Placeholder 8"/>
+          <p:cNvPr id="9" name="Slide Number Placeholder 8">
+            <a:extLst>
+              <a:ext uri="{FF2B5EF4-FFF2-40B4-BE49-F238E27FC236}">
+                <a16:creationId xmlns:a16="http://schemas.microsoft.com/office/drawing/2014/main" id="{58C64C77-FB6D-41D5-9BFB-9384873ABA11}"/>
+              </a:ext>
+            </a:extLst>
+          </p:cNvPr>
           <p:cNvSpPr>
             <a:spLocks noGrp="1"/>
           </p:cNvSpPr>
@@ -2230,7 +2250,7 @@
     </p:spTree>
     <p:extLst>
       <p:ext uri="{BB962C8B-B14F-4D97-AF65-F5344CB8AC3E}">
-        <p14:creationId xmlns:p14="http://schemas.microsoft.com/office/powerpoint/2010/main" val="1132776142"/>
+        <p14:creationId xmlns:p14="http://schemas.microsoft.com/office/powerpoint/2010/main" val="3185000599"/>
       </p:ext>
     </p:extLst>
   </p:cSld>
@@ -2259,7 +2279,13 @@
       </p:grpSpPr>
       <p:sp>
         <p:nvSpPr>
-          <p:cNvPr id="2" name="Title 1"/>
+          <p:cNvPr id="2" name="Title 1">
+            <a:extLst>
+              <a:ext uri="{FF2B5EF4-FFF2-40B4-BE49-F238E27FC236}">
+                <a16:creationId xmlns:a16="http://schemas.microsoft.com/office/drawing/2014/main" id="{9E7B851A-B137-41AD-8657-1545DAAE654E}"/>
+              </a:ext>
+            </a:extLst>
+          </p:cNvPr>
           <p:cNvSpPr>
             <a:spLocks noGrp="1"/>
           </p:cNvSpPr>
@@ -2276,13 +2302,18 @@
               <a:rPr lang="en-US"/>
               <a:t>Click to edit Master title style</a:t>
             </a:r>
-            <a:endParaRPr lang="en-US" dirty="0"/>
-          </a:p>
-        </p:txBody>
-      </p:sp>
-      <p:sp>
-        <p:nvSpPr>
-          <p:cNvPr id="3" name="Date Placeholder 2"/>
+          </a:p>
+        </p:txBody>
+      </p:sp>
+      <p:sp>
+        <p:nvSpPr>
+          <p:cNvPr id="3" name="Date Placeholder 2">
+            <a:extLst>
+              <a:ext uri="{FF2B5EF4-FFF2-40B4-BE49-F238E27FC236}">
+                <a16:creationId xmlns:a16="http://schemas.microsoft.com/office/drawing/2014/main" id="{22D125F9-928D-4C93-896F-D8163329E540}"/>
+              </a:ext>
+            </a:extLst>
+          </p:cNvPr>
           <p:cNvSpPr>
             <a:spLocks noGrp="1"/>
           </p:cNvSpPr>
@@ -2305,7 +2336,13 @@
       </p:sp>
       <p:sp>
         <p:nvSpPr>
-          <p:cNvPr id="4" name="Footer Placeholder 3"/>
+          <p:cNvPr id="4" name="Footer Placeholder 3">
+            <a:extLst>
+              <a:ext uri="{FF2B5EF4-FFF2-40B4-BE49-F238E27FC236}">
+                <a16:creationId xmlns:a16="http://schemas.microsoft.com/office/drawing/2014/main" id="{3FEE35EF-329F-49D1-82FC-650B9860F5CD}"/>
+              </a:ext>
+            </a:extLst>
+          </p:cNvPr>
           <p:cNvSpPr>
             <a:spLocks noGrp="1"/>
           </p:cNvSpPr>
@@ -2324,7 +2361,13 @@
       </p:sp>
       <p:sp>
         <p:nvSpPr>
-          <p:cNvPr id="5" name="Slide Number Placeholder 4"/>
+          <p:cNvPr id="5" name="Slide Number Placeholder 4">
+            <a:extLst>
+              <a:ext uri="{FF2B5EF4-FFF2-40B4-BE49-F238E27FC236}">
+                <a16:creationId xmlns:a16="http://schemas.microsoft.com/office/drawing/2014/main" id="{22ECF1CA-F148-42E8-B418-261801BF625B}"/>
+              </a:ext>
+            </a:extLst>
+          </p:cNvPr>
           <p:cNvSpPr>
             <a:spLocks noGrp="1"/>
           </p:cNvSpPr>
@@ -2348,7 +2391,7 @@
     </p:spTree>
     <p:extLst>
       <p:ext uri="{BB962C8B-B14F-4D97-AF65-F5344CB8AC3E}">
-        <p14:creationId xmlns:p14="http://schemas.microsoft.com/office/powerpoint/2010/main" val="2041129549"/>
+        <p14:creationId xmlns:p14="http://schemas.microsoft.com/office/powerpoint/2010/main" val="517648023"/>
       </p:ext>
     </p:extLst>
   </p:cSld>
@@ -2377,7 +2420,13 @@
       </p:grpSpPr>
       <p:sp>
         <p:nvSpPr>
-          <p:cNvPr id="2" name="Date Placeholder 1"/>
+          <p:cNvPr id="2" name="Date Placeholder 1">
+            <a:extLst>
+              <a:ext uri="{FF2B5EF4-FFF2-40B4-BE49-F238E27FC236}">
+                <a16:creationId xmlns:a16="http://schemas.microsoft.com/office/drawing/2014/main" id="{07C75050-0B5B-47B9-9A26-A120F7847875}"/>
+              </a:ext>
+            </a:extLst>
+          </p:cNvPr>
           <p:cNvSpPr>
             <a:spLocks noGrp="1"/>
           </p:cNvSpPr>
@@ -2400,7 +2449,13 @@
       </p:sp>
       <p:sp>
         <p:nvSpPr>
-          <p:cNvPr id="3" name="Footer Placeholder 2"/>
+          <p:cNvPr id="3" name="Footer Placeholder 2">
+            <a:extLst>
+              <a:ext uri="{FF2B5EF4-FFF2-40B4-BE49-F238E27FC236}">
+                <a16:creationId xmlns:a16="http://schemas.microsoft.com/office/drawing/2014/main" id="{421C643C-9501-419B-AFBA-71AC1ECA33BE}"/>
+              </a:ext>
+            </a:extLst>
+          </p:cNvPr>
           <p:cNvSpPr>
             <a:spLocks noGrp="1"/>
           </p:cNvSpPr>
@@ -2419,7 +2474,13 @@
       </p:sp>
       <p:sp>
         <p:nvSpPr>
-          <p:cNvPr id="4" name="Slide Number Placeholder 3"/>
+          <p:cNvPr id="4" name="Slide Number Placeholder 3">
+            <a:extLst>
+              <a:ext uri="{FF2B5EF4-FFF2-40B4-BE49-F238E27FC236}">
+                <a16:creationId xmlns:a16="http://schemas.microsoft.com/office/drawing/2014/main" id="{8C0C4A58-AC5D-42DD-8E10-DD87884315A8}"/>
+              </a:ext>
+            </a:extLst>
+          </p:cNvPr>
           <p:cNvSpPr>
             <a:spLocks noGrp="1"/>
           </p:cNvSpPr>
@@ -2443,7 +2504,7 @@
     </p:spTree>
     <p:extLst>
       <p:ext uri="{BB962C8B-B14F-4D97-AF65-F5344CB8AC3E}">
-        <p14:creationId xmlns:p14="http://schemas.microsoft.com/office/powerpoint/2010/main" val="3512238338"/>
+        <p14:creationId xmlns:p14="http://schemas.microsoft.com/office/powerpoint/2010/main" val="920985578"/>
       </p:ext>
     </p:extLst>
   </p:cSld>
@@ -2472,7 +2533,13 @@
       </p:grpSpPr>
       <p:sp>
         <p:nvSpPr>
-          <p:cNvPr id="2" name="Title 1"/>
+          <p:cNvPr id="2" name="Title 1">
+            <a:extLst>
+              <a:ext uri="{FF2B5EF4-FFF2-40B4-BE49-F238E27FC236}">
+                <a16:creationId xmlns:a16="http://schemas.microsoft.com/office/drawing/2014/main" id="{D25F1DBC-1D4A-4D72-8F6C-5C6EF8DB5EE1}"/>
+              </a:ext>
+            </a:extLst>
+          </p:cNvPr>
           <p:cNvSpPr>
             <a:spLocks noGrp="1"/>
           </p:cNvSpPr>
@@ -2482,8 +2549,8 @@
         </p:nvSpPr>
         <p:spPr>
           <a:xfrm>
-            <a:off x="682328" y="457200"/>
-            <a:ext cx="3194943" cy="1600200"/>
+            <a:off x="839788" y="457200"/>
+            <a:ext cx="3932237" cy="1600200"/>
           </a:xfrm>
         </p:spPr>
         <p:txBody>
@@ -2498,13 +2565,18 @@
               <a:rPr lang="en-US"/>
               <a:t>Click to edit Master title style</a:t>
             </a:r>
-            <a:endParaRPr lang="en-US" dirty="0"/>
-          </a:p>
-        </p:txBody>
-      </p:sp>
-      <p:sp>
-        <p:nvSpPr>
-          <p:cNvPr id="3" name="Content Placeholder 2"/>
+          </a:p>
+        </p:txBody>
+      </p:sp>
+      <p:sp>
+        <p:nvSpPr>
+          <p:cNvPr id="3" name="Content Placeholder 2">
+            <a:extLst>
+              <a:ext uri="{FF2B5EF4-FFF2-40B4-BE49-F238E27FC236}">
+                <a16:creationId xmlns:a16="http://schemas.microsoft.com/office/drawing/2014/main" id="{3D8FDCCC-F364-45D8-892F-039B1BAADA65}"/>
+              </a:ext>
+            </a:extLst>
+          </p:cNvPr>
           <p:cNvSpPr>
             <a:spLocks noGrp="1"/>
           </p:cNvSpPr>
@@ -2514,8 +2586,8 @@
         </p:nvSpPr>
         <p:spPr>
           <a:xfrm>
-            <a:off x="4211340" y="987427"/>
-            <a:ext cx="5014913" cy="4873625"/>
+            <a:off x="5183188" y="987425"/>
+            <a:ext cx="6172200" cy="4873625"/>
           </a:xfrm>
         </p:spPr>
         <p:txBody>
@@ -2583,13 +2655,18 @@
               <a:rPr lang="en-US"/>
               <a:t>Fifth level</a:t>
             </a:r>
-            <a:endParaRPr lang="en-US" dirty="0"/>
-          </a:p>
-        </p:txBody>
-      </p:sp>
-      <p:sp>
-        <p:nvSpPr>
-          <p:cNvPr id="4" name="Text Placeholder 3"/>
+          </a:p>
+        </p:txBody>
+      </p:sp>
+      <p:sp>
+        <p:nvSpPr>
+          <p:cNvPr id="4" name="Text Placeholder 3">
+            <a:extLst>
+              <a:ext uri="{FF2B5EF4-FFF2-40B4-BE49-F238E27FC236}">
+                <a16:creationId xmlns:a16="http://schemas.microsoft.com/office/drawing/2014/main" id="{0BB42220-A9AA-4031-91F0-2DCA2BA6CBC9}"/>
+              </a:ext>
+            </a:extLst>
+          </p:cNvPr>
           <p:cNvSpPr>
             <a:spLocks noGrp="1"/>
           </p:cNvSpPr>
@@ -2599,8 +2676,8 @@
         </p:nvSpPr>
         <p:spPr>
           <a:xfrm>
-            <a:off x="682328" y="2057400"/>
-            <a:ext cx="3194943" cy="3811588"/>
+            <a:off x="839788" y="2057400"/>
+            <a:ext cx="3932237" cy="3811588"/>
           </a:xfrm>
         </p:spPr>
         <p:txBody>
@@ -2654,7 +2731,13 @@
       </p:sp>
       <p:sp>
         <p:nvSpPr>
-          <p:cNvPr id="5" name="Date Placeholder 4"/>
+          <p:cNvPr id="5" name="Date Placeholder 4">
+            <a:extLst>
+              <a:ext uri="{FF2B5EF4-FFF2-40B4-BE49-F238E27FC236}">
+                <a16:creationId xmlns:a16="http://schemas.microsoft.com/office/drawing/2014/main" id="{71F7CE5D-84FB-415B-A6D7-FE32765A5AAB}"/>
+              </a:ext>
+            </a:extLst>
+          </p:cNvPr>
           <p:cNvSpPr>
             <a:spLocks noGrp="1"/>
           </p:cNvSpPr>
@@ -2677,7 +2760,13 @@
       </p:sp>
       <p:sp>
         <p:nvSpPr>
-          <p:cNvPr id="6" name="Footer Placeholder 5"/>
+          <p:cNvPr id="6" name="Footer Placeholder 5">
+            <a:extLst>
+              <a:ext uri="{FF2B5EF4-FFF2-40B4-BE49-F238E27FC236}">
+                <a16:creationId xmlns:a16="http://schemas.microsoft.com/office/drawing/2014/main" id="{088CF854-78A4-401E-9241-CD8C2CAF1BE0}"/>
+              </a:ext>
+            </a:extLst>
+          </p:cNvPr>
           <p:cNvSpPr>
             <a:spLocks noGrp="1"/>
           </p:cNvSpPr>
@@ -2696,7 +2785,13 @@
       </p:sp>
       <p:sp>
         <p:nvSpPr>
-          <p:cNvPr id="7" name="Slide Number Placeholder 6"/>
+          <p:cNvPr id="7" name="Slide Number Placeholder 6">
+            <a:extLst>
+              <a:ext uri="{FF2B5EF4-FFF2-40B4-BE49-F238E27FC236}">
+                <a16:creationId xmlns:a16="http://schemas.microsoft.com/office/drawing/2014/main" id="{6B58E8A2-8CAE-47DA-B247-75E61F505BF4}"/>
+              </a:ext>
+            </a:extLst>
+          </p:cNvPr>
           <p:cNvSpPr>
             <a:spLocks noGrp="1"/>
           </p:cNvSpPr>
@@ -2720,7 +2815,7 @@
     </p:spTree>
     <p:extLst>
       <p:ext uri="{BB962C8B-B14F-4D97-AF65-F5344CB8AC3E}">
-        <p14:creationId xmlns:p14="http://schemas.microsoft.com/office/powerpoint/2010/main" val="3358370881"/>
+        <p14:creationId xmlns:p14="http://schemas.microsoft.com/office/powerpoint/2010/main" val="1830423891"/>
       </p:ext>
     </p:extLst>
   </p:cSld>
@@ -2749,7 +2844,13 @@
       </p:grpSpPr>
       <p:sp>
         <p:nvSpPr>
-          <p:cNvPr id="2" name="Title 1"/>
+          <p:cNvPr id="2" name="Title 1">
+            <a:extLst>
+              <a:ext uri="{FF2B5EF4-FFF2-40B4-BE49-F238E27FC236}">
+                <a16:creationId xmlns:a16="http://schemas.microsoft.com/office/drawing/2014/main" id="{9C225764-A8C5-4491-93DD-3EEEE35BBA73}"/>
+              </a:ext>
+            </a:extLst>
+          </p:cNvPr>
           <p:cNvSpPr>
             <a:spLocks noGrp="1"/>
           </p:cNvSpPr>
@@ -2759,8 +2860,8 @@
         </p:nvSpPr>
         <p:spPr>
           <a:xfrm>
-            <a:off x="682328" y="457200"/>
-            <a:ext cx="3194943" cy="1600200"/>
+            <a:off x="839788" y="457200"/>
+            <a:ext cx="3932237" cy="1600200"/>
           </a:xfrm>
         </p:spPr>
         <p:txBody>
@@ -2775,15 +2876,20 @@
               <a:rPr lang="en-US"/>
               <a:t>Click to edit Master title style</a:t>
             </a:r>
-            <a:endParaRPr lang="en-US" dirty="0"/>
-          </a:p>
-        </p:txBody>
-      </p:sp>
-      <p:sp>
-        <p:nvSpPr>
-          <p:cNvPr id="3" name="Picture Placeholder 2"/>
-          <p:cNvSpPr>
-            <a:spLocks noGrp="1" noChangeAspect="1"/>
+          </a:p>
+        </p:txBody>
+      </p:sp>
+      <p:sp>
+        <p:nvSpPr>
+          <p:cNvPr id="3" name="Picture Placeholder 2">
+            <a:extLst>
+              <a:ext uri="{FF2B5EF4-FFF2-40B4-BE49-F238E27FC236}">
+                <a16:creationId xmlns:a16="http://schemas.microsoft.com/office/drawing/2014/main" id="{D2A8EEC4-95F0-4CD6-AEB6-3477D7DF8EC7}"/>
+              </a:ext>
+            </a:extLst>
+          </p:cNvPr>
+          <p:cNvSpPr>
+            <a:spLocks noGrp="1"/>
           </p:cNvSpPr>
           <p:nvPr>
             <p:ph type="pic" idx="1"/>
@@ -2791,12 +2897,12 @@
         </p:nvSpPr>
         <p:spPr>
           <a:xfrm>
-            <a:off x="4211340" y="987427"/>
-            <a:ext cx="5014913" cy="4873625"/>
+            <a:off x="5183188" y="987425"/>
+            <a:ext cx="6172200" cy="4873625"/>
           </a:xfrm>
         </p:spPr>
         <p:txBody>
-          <a:bodyPr anchor="t"/>
+          <a:bodyPr/>
           <a:lstStyle>
             <a:lvl1pPr marL="0" indent="0">
               <a:buNone/>
@@ -2836,17 +2942,19 @@
             </a:lvl9pPr>
           </a:lstStyle>
           <a:p>
-            <a:r>
-              <a:rPr lang="en-US"/>
-              <a:t>Click icon to add picture</a:t>
-            </a:r>
-            <a:endParaRPr lang="en-US" dirty="0"/>
-          </a:p>
-        </p:txBody>
-      </p:sp>
-      <p:sp>
-        <p:nvSpPr>
-          <p:cNvPr id="4" name="Text Placeholder 3"/>
+            <a:endParaRPr lang="en-US"/>
+          </a:p>
+        </p:txBody>
+      </p:sp>
+      <p:sp>
+        <p:nvSpPr>
+          <p:cNvPr id="4" name="Text Placeholder 3">
+            <a:extLst>
+              <a:ext uri="{FF2B5EF4-FFF2-40B4-BE49-F238E27FC236}">
+                <a16:creationId xmlns:a16="http://schemas.microsoft.com/office/drawing/2014/main" id="{0E6E8905-EF91-4E50-A13C-222BC963393E}"/>
+              </a:ext>
+            </a:extLst>
+          </p:cNvPr>
           <p:cNvSpPr>
             <a:spLocks noGrp="1"/>
           </p:cNvSpPr>
@@ -2856,8 +2964,8 @@
         </p:nvSpPr>
         <p:spPr>
           <a:xfrm>
-            <a:off x="682328" y="2057400"/>
-            <a:ext cx="3194943" cy="3811588"/>
+            <a:off x="839788" y="2057400"/>
+            <a:ext cx="3932237" cy="3811588"/>
           </a:xfrm>
         </p:spPr>
         <p:txBody>
@@ -2911,7 +3019,13 @@
       </p:sp>
       <p:sp>
         <p:nvSpPr>
-          <p:cNvPr id="5" name="Date Placeholder 4"/>
+          <p:cNvPr id="5" name="Date Placeholder 4">
+            <a:extLst>
+              <a:ext uri="{FF2B5EF4-FFF2-40B4-BE49-F238E27FC236}">
+                <a16:creationId xmlns:a16="http://schemas.microsoft.com/office/drawing/2014/main" id="{DD545264-1D73-487F-8D3E-0404D64CDA1E}"/>
+              </a:ext>
+            </a:extLst>
+          </p:cNvPr>
           <p:cNvSpPr>
             <a:spLocks noGrp="1"/>
           </p:cNvSpPr>
@@ -2934,7 +3048,13 @@
       </p:sp>
       <p:sp>
         <p:nvSpPr>
-          <p:cNvPr id="6" name="Footer Placeholder 5"/>
+          <p:cNvPr id="6" name="Footer Placeholder 5">
+            <a:extLst>
+              <a:ext uri="{FF2B5EF4-FFF2-40B4-BE49-F238E27FC236}">
+                <a16:creationId xmlns:a16="http://schemas.microsoft.com/office/drawing/2014/main" id="{08793A70-EF9B-4652-B28B-1B64EB476F0A}"/>
+              </a:ext>
+            </a:extLst>
+          </p:cNvPr>
           <p:cNvSpPr>
             <a:spLocks noGrp="1"/>
           </p:cNvSpPr>
@@ -2953,7 +3073,13 @@
       </p:sp>
       <p:sp>
         <p:nvSpPr>
-          <p:cNvPr id="7" name="Slide Number Placeholder 6"/>
+          <p:cNvPr id="7" name="Slide Number Placeholder 6">
+            <a:extLst>
+              <a:ext uri="{FF2B5EF4-FFF2-40B4-BE49-F238E27FC236}">
+                <a16:creationId xmlns:a16="http://schemas.microsoft.com/office/drawing/2014/main" id="{5DC3ABE1-02E6-4BA0-AB26-9394149411C5}"/>
+              </a:ext>
+            </a:extLst>
+          </p:cNvPr>
           <p:cNvSpPr>
             <a:spLocks noGrp="1"/>
           </p:cNvSpPr>
@@ -2977,7 +3103,7 @@
     </p:spTree>
     <p:extLst>
       <p:ext uri="{BB962C8B-B14F-4D97-AF65-F5344CB8AC3E}">
-        <p14:creationId xmlns:p14="http://schemas.microsoft.com/office/powerpoint/2010/main" val="283739394"/>
+        <p14:creationId xmlns:p14="http://schemas.microsoft.com/office/powerpoint/2010/main" val="1576962411"/>
       </p:ext>
     </p:extLst>
   </p:cSld>
@@ -3011,7 +3137,13 @@
       </p:grpSpPr>
       <p:sp>
         <p:nvSpPr>
-          <p:cNvPr id="2" name="Title Placeholder 1"/>
+          <p:cNvPr id="2" name="Title Placeholder 1">
+            <a:extLst>
+              <a:ext uri="{FF2B5EF4-FFF2-40B4-BE49-F238E27FC236}">
+                <a16:creationId xmlns:a16="http://schemas.microsoft.com/office/drawing/2014/main" id="{8F825280-960C-4D44-8A31-03DEC5B2B42B}"/>
+              </a:ext>
+            </a:extLst>
+          </p:cNvPr>
           <p:cNvSpPr>
             <a:spLocks noGrp="1"/>
           </p:cNvSpPr>
@@ -3021,8 +3153,8 @@
         </p:nvSpPr>
         <p:spPr>
           <a:xfrm>
-            <a:off x="681038" y="365127"/>
-            <a:ext cx="8543925" cy="1325563"/>
+            <a:off x="838200" y="365125"/>
+            <a:ext cx="10515600" cy="1325563"/>
           </a:xfrm>
           <a:prstGeom prst="rect">
             <a:avLst/>
@@ -3043,7 +3175,13 @@
       </p:sp>
       <p:sp>
         <p:nvSpPr>
-          <p:cNvPr id="3" name="Text Placeholder 2"/>
+          <p:cNvPr id="3" name="Text Placeholder 2">
+            <a:extLst>
+              <a:ext uri="{FF2B5EF4-FFF2-40B4-BE49-F238E27FC236}">
+                <a16:creationId xmlns:a16="http://schemas.microsoft.com/office/drawing/2014/main" id="{95385375-3E6C-4F91-B1D7-DAED8B96B3A7}"/>
+              </a:ext>
+            </a:extLst>
+          </p:cNvPr>
           <p:cNvSpPr>
             <a:spLocks noGrp="1"/>
           </p:cNvSpPr>
@@ -3053,8 +3191,8 @@
         </p:nvSpPr>
         <p:spPr>
           <a:xfrm>
-            <a:off x="681038" y="1825625"/>
-            <a:ext cx="8543925" cy="4351338"/>
+            <a:off x="838200" y="1825625"/>
+            <a:ext cx="10515600" cy="4351338"/>
           </a:xfrm>
           <a:prstGeom prst="rect">
             <a:avLst/>
@@ -3099,13 +3237,18 @@
               <a:rPr lang="en-US"/>
               <a:t>Fifth level</a:t>
             </a:r>
-            <a:endParaRPr lang="en-US" dirty="0"/>
-          </a:p>
-        </p:txBody>
-      </p:sp>
-      <p:sp>
-        <p:nvSpPr>
-          <p:cNvPr id="4" name="Date Placeholder 3"/>
+          </a:p>
+        </p:txBody>
+      </p:sp>
+      <p:sp>
+        <p:nvSpPr>
+          <p:cNvPr id="4" name="Date Placeholder 3">
+            <a:extLst>
+              <a:ext uri="{FF2B5EF4-FFF2-40B4-BE49-F238E27FC236}">
+                <a16:creationId xmlns:a16="http://schemas.microsoft.com/office/drawing/2014/main" id="{5E32D823-8433-4143-B3D3-64DC9DA26290}"/>
+              </a:ext>
+            </a:extLst>
+          </p:cNvPr>
           <p:cNvSpPr>
             <a:spLocks noGrp="1"/>
           </p:cNvSpPr>
@@ -3115,8 +3258,8 @@
         </p:nvSpPr>
         <p:spPr>
           <a:xfrm>
-            <a:off x="681038" y="6356352"/>
-            <a:ext cx="2228850" cy="365125"/>
+            <a:off x="838200" y="6356350"/>
+            <a:ext cx="2743200" cy="365125"/>
           </a:xfrm>
           <a:prstGeom prst="rect">
             <a:avLst/>
@@ -3146,7 +3289,13 @@
       </p:sp>
       <p:sp>
         <p:nvSpPr>
-          <p:cNvPr id="5" name="Footer Placeholder 4"/>
+          <p:cNvPr id="5" name="Footer Placeholder 4">
+            <a:extLst>
+              <a:ext uri="{FF2B5EF4-FFF2-40B4-BE49-F238E27FC236}">
+                <a16:creationId xmlns:a16="http://schemas.microsoft.com/office/drawing/2014/main" id="{550E3A69-32CC-41D0-9FDC-8971A0B27E7B}"/>
+              </a:ext>
+            </a:extLst>
+          </p:cNvPr>
           <p:cNvSpPr>
             <a:spLocks noGrp="1"/>
           </p:cNvSpPr>
@@ -3156,8 +3305,8 @@
         </p:nvSpPr>
         <p:spPr>
           <a:xfrm>
-            <a:off x="3281363" y="6356352"/>
-            <a:ext cx="3343275" cy="365125"/>
+            <a:off x="4038600" y="6356350"/>
+            <a:ext cx="4114800" cy="365125"/>
           </a:xfrm>
           <a:prstGeom prst="rect">
             <a:avLst/>
@@ -3183,7 +3332,13 @@
       </p:sp>
       <p:sp>
         <p:nvSpPr>
-          <p:cNvPr id="6" name="Slide Number Placeholder 5"/>
+          <p:cNvPr id="6" name="Slide Number Placeholder 5">
+            <a:extLst>
+              <a:ext uri="{FF2B5EF4-FFF2-40B4-BE49-F238E27FC236}">
+                <a16:creationId xmlns:a16="http://schemas.microsoft.com/office/drawing/2014/main" id="{29D65DAC-2595-499C-AFCD-D94E3E95694D}"/>
+              </a:ext>
+            </a:extLst>
+          </p:cNvPr>
           <p:cNvSpPr>
             <a:spLocks noGrp="1"/>
           </p:cNvSpPr>
@@ -3193,8 +3348,8 @@
         </p:nvSpPr>
         <p:spPr>
           <a:xfrm>
-            <a:off x="6996113" y="6356352"/>
-            <a:ext cx="2228850" cy="365125"/>
+            <a:off x="8610600" y="6356350"/>
+            <a:ext cx="2743200" cy="365125"/>
           </a:xfrm>
           <a:prstGeom prst="rect">
             <a:avLst/>
@@ -3227,7 +3382,7 @@
           <p:cNvPr id="7" name="Picture 6" descr="A close up of a sign&#10;&#10;Description automatically generated">
             <a:extLst>
               <a:ext uri="{FF2B5EF4-FFF2-40B4-BE49-F238E27FC236}">
-                <a16:creationId xmlns:a16="http://schemas.microsoft.com/office/drawing/2014/main" id="{7DEDE7C0-BD85-460A-A7DE-618AF32CDEAF}"/>
+                <a16:creationId xmlns:a16="http://schemas.microsoft.com/office/drawing/2014/main" id="{C8F349C0-CDBB-4923-97E3-E859240E5F4C}"/>
               </a:ext>
             </a:extLst>
           </p:cNvPr>
@@ -3244,8 +3399,8 @@
         </p:blipFill>
         <p:spPr>
           <a:xfrm>
-            <a:off x="9289741" y="6176963"/>
-            <a:ext cx="616259" cy="681037"/>
+            <a:off x="11433527" y="6176962"/>
+            <a:ext cx="758473" cy="681037"/>
           </a:xfrm>
           <a:prstGeom prst="rect">
             <a:avLst/>
@@ -3255,23 +3410,23 @@
     </p:spTree>
     <p:extLst>
       <p:ext uri="{BB962C8B-B14F-4D97-AF65-F5344CB8AC3E}">
-        <p14:creationId xmlns:p14="http://schemas.microsoft.com/office/powerpoint/2010/main" val="2957868525"/>
+        <p14:creationId xmlns:p14="http://schemas.microsoft.com/office/powerpoint/2010/main" val="1555971421"/>
       </p:ext>
     </p:extLst>
   </p:cSld>
   <p:clrMap bg1="lt1" tx1="dk1" bg2="lt2" tx2="dk2" accent1="accent1" accent2="accent2" accent3="accent3" accent4="accent4" accent5="accent5" accent6="accent6" hlink="hlink" folHlink="folHlink"/>
   <p:sldLayoutIdLst>
-    <p:sldLayoutId id="2147483739" r:id="rId1"/>
-    <p:sldLayoutId id="2147483740" r:id="rId2"/>
-    <p:sldLayoutId id="2147483741" r:id="rId3"/>
-    <p:sldLayoutId id="2147483742" r:id="rId4"/>
-    <p:sldLayoutId id="2147483743" r:id="rId5"/>
-    <p:sldLayoutId id="2147483744" r:id="rId6"/>
-    <p:sldLayoutId id="2147483745" r:id="rId7"/>
-    <p:sldLayoutId id="2147483746" r:id="rId8"/>
-    <p:sldLayoutId id="2147483747" r:id="rId9"/>
-    <p:sldLayoutId id="2147483748" r:id="rId10"/>
-    <p:sldLayoutId id="2147483749" r:id="rId11"/>
+    <p:sldLayoutId id="2147483727" r:id="rId1"/>
+    <p:sldLayoutId id="2147483728" r:id="rId2"/>
+    <p:sldLayoutId id="2147483729" r:id="rId3"/>
+    <p:sldLayoutId id="2147483730" r:id="rId4"/>
+    <p:sldLayoutId id="2147483731" r:id="rId5"/>
+    <p:sldLayoutId id="2147483732" r:id="rId6"/>
+    <p:sldLayoutId id="2147483733" r:id="rId7"/>
+    <p:sldLayoutId id="2147483734" r:id="rId8"/>
+    <p:sldLayoutId id="2147483735" r:id="rId9"/>
+    <p:sldLayoutId id="2147483736" r:id="rId10"/>
+    <p:sldLayoutId id="2147483737" r:id="rId11"/>
   </p:sldLayoutIdLst>
   <p:txStyles>
     <p:titleStyle>
@@ -3283,7 +3438,7 @@
           <a:spcPct val="0"/>
         </a:spcBef>
         <a:buNone/>
-        <a:defRPr sz="4400" b="1" kern="1200">
+        <a:defRPr sz="5600" b="1" kern="1200">
           <a:solidFill>
             <a:schemeClr val="tx1"/>
           </a:solidFill>
@@ -3575,7 +3730,13 @@
       </p:grpSpPr>
       <p:sp>
         <p:nvSpPr>
-          <p:cNvPr id="2" name="Title 1"/>
+          <p:cNvPr id="4" name="Title 3">
+            <a:extLst>
+              <a:ext uri="{FF2B5EF4-FFF2-40B4-BE49-F238E27FC236}">
+                <a16:creationId xmlns:a16="http://schemas.microsoft.com/office/drawing/2014/main" id="{7C8E6A50-BE08-49F8-AA39-361B60FAABB7}"/>
+              </a:ext>
+            </a:extLst>
+          </p:cNvPr>
           <p:cNvSpPr>
             <a:spLocks noGrp="1"/>
           </p:cNvSpPr>
@@ -3583,32 +3744,24 @@
             <p:ph type="ctrTitle"/>
           </p:nvPr>
         </p:nvSpPr>
-        <p:spPr>
-          <a:xfrm>
-            <a:off x="2474362" y="2303414"/>
-            <a:ext cx="4960470" cy="1650232"/>
-          </a:xfrm>
-        </p:spPr>
-        <p:txBody>
-          <a:bodyPr>
-            <a:normAutofit/>
-          </a:bodyPr>
-          <a:lstStyle/>
-          <a:p>
-            <a:r>
-              <a:rPr lang="en-US">
-                <a:solidFill>
-                  <a:srgbClr val="FFFFFF"/>
-                </a:solidFill>
-              </a:rPr>
-              <a:t>Title</a:t>
-            </a:r>
-          </a:p>
-        </p:txBody>
-      </p:sp>
-      <p:sp>
-        <p:nvSpPr>
-          <p:cNvPr id="3" name="Subtitle 2"/>
+        <p:spPr/>
+        <p:txBody>
+          <a:bodyPr/>
+          <a:lstStyle/>
+          <a:p>
+            <a:endParaRPr lang="en-US"/>
+          </a:p>
+        </p:txBody>
+      </p:sp>
+      <p:sp>
+        <p:nvSpPr>
+          <p:cNvPr id="5" name="Subtitle 4">
+            <a:extLst>
+              <a:ext uri="{FF2B5EF4-FFF2-40B4-BE49-F238E27FC236}">
+                <a16:creationId xmlns:a16="http://schemas.microsoft.com/office/drawing/2014/main" id="{BBC363C1-9C77-405C-A511-9369CFF8B14A}"/>
+              </a:ext>
+            </a:extLst>
+          </p:cNvPr>
           <p:cNvSpPr>
             <a:spLocks noGrp="1"/>
           </p:cNvSpPr>
@@ -3616,33 +3769,19 @@
             <p:ph type="subTitle" idx="1"/>
           </p:nvPr>
         </p:nvSpPr>
-        <p:spPr>
-          <a:xfrm>
-            <a:off x="2474362" y="3953646"/>
-            <a:ext cx="4960470" cy="554189"/>
-          </a:xfrm>
-        </p:spPr>
-        <p:txBody>
-          <a:bodyPr>
-            <a:normAutofit/>
-          </a:bodyPr>
-          <a:lstStyle/>
-          <a:p>
-            <a:r>
-              <a:rPr lang="en-US">
-                <a:solidFill>
-                  <a:srgbClr val="FFFFFF"/>
-                </a:solidFill>
-              </a:rPr>
-              <a:t>Subtitle</a:t>
-            </a:r>
+        <p:spPr/>
+        <p:txBody>
+          <a:bodyPr/>
+          <a:lstStyle/>
+          <a:p>
+            <a:endParaRPr lang="en-US"/>
           </a:p>
         </p:txBody>
       </p:sp>
     </p:spTree>
     <p:extLst>
       <p:ext uri="{BB962C8B-B14F-4D97-AF65-F5344CB8AC3E}">
-        <p14:creationId xmlns:p14="http://schemas.microsoft.com/office/powerpoint/2010/main" val="392669009"/>
+        <p14:creationId xmlns:p14="http://schemas.microsoft.com/office/powerpoint/2010/main" val="3044906176"/>
       </p:ext>
     </p:extLst>
   </p:cSld>
@@ -3671,7 +3810,13 @@
       </p:grpSpPr>
       <p:sp>
         <p:nvSpPr>
-          <p:cNvPr id="2" name="Title 1"/>
+          <p:cNvPr id="2" name="Title 1">
+            <a:extLst>
+              <a:ext uri="{FF2B5EF4-FFF2-40B4-BE49-F238E27FC236}">
+                <a16:creationId xmlns:a16="http://schemas.microsoft.com/office/drawing/2014/main" id="{0E7DE74D-3D97-4872-B2C2-3829DEDD2AA6}"/>
+              </a:ext>
+            </a:extLst>
+          </p:cNvPr>
           <p:cNvSpPr>
             <a:spLocks noGrp="1"/>
           </p:cNvSpPr>
@@ -3684,16 +3829,19 @@
           <a:bodyPr/>
           <a:lstStyle/>
           <a:p>
-            <a:r>
-              <a:rPr lang="en-US" dirty="0"/>
-              <a:t>Slide Title</a:t>
-            </a:r>
-          </a:p>
-        </p:txBody>
-      </p:sp>
-      <p:sp>
-        <p:nvSpPr>
-          <p:cNvPr id="3" name="Content Placeholder 2"/>
+            <a:endParaRPr lang="en-US"/>
+          </a:p>
+        </p:txBody>
+      </p:sp>
+      <p:sp>
+        <p:nvSpPr>
+          <p:cNvPr id="3" name="Content Placeholder 2">
+            <a:extLst>
+              <a:ext uri="{FF2B5EF4-FFF2-40B4-BE49-F238E27FC236}">
+                <a16:creationId xmlns:a16="http://schemas.microsoft.com/office/drawing/2014/main" id="{2BB71EE1-B472-4592-A40F-8B0E2A89E39C}"/>
+              </a:ext>
+            </a:extLst>
+          </p:cNvPr>
           <p:cNvSpPr>
             <a:spLocks noGrp="1"/>
           </p:cNvSpPr>
@@ -3706,24 +3854,14 @@
           <a:bodyPr/>
           <a:lstStyle/>
           <a:p>
-            <a:pPr marL="0" indent="0">
-              <a:buNone/>
-            </a:pPr>
-            <a:r>
-              <a:rPr lang="en-US" dirty="0"/>
-              <a:t>Hello</a:t>
-            </a:r>
-            <a:r>
-              <a:rPr lang="en-US"/>
-              <a:t>, world.</a:t>
-            </a:r>
+            <a:endParaRPr lang="en-US"/>
           </a:p>
         </p:txBody>
       </p:sp>
     </p:spTree>
     <p:extLst>
       <p:ext uri="{BB962C8B-B14F-4D97-AF65-F5344CB8AC3E}">
-        <p14:creationId xmlns:p14="http://schemas.microsoft.com/office/powerpoint/2010/main" val="572707455"/>
+        <p14:creationId xmlns:p14="http://schemas.microsoft.com/office/powerpoint/2010/main" val="2188285162"/>
       </p:ext>
     </p:extLst>
   </p:cSld>
@@ -3755,7 +3893,7 @@
           <p:cNvPr id="4" name="Title 3">
             <a:extLst>
               <a:ext uri="{FF2B5EF4-FFF2-40B4-BE49-F238E27FC236}">
-                <a16:creationId xmlns:a16="http://schemas.microsoft.com/office/drawing/2014/main" id="{4D7EA5A8-CF7C-462E-A2B6-36D7CBEDC829}"/>
+                <a16:creationId xmlns:a16="http://schemas.microsoft.com/office/drawing/2014/main" id="{1AA15C28-3B60-4A6F-87BC-E0501966E7B2}"/>
               </a:ext>
             </a:extLst>
           </p:cNvPr>
@@ -3780,7 +3918,7 @@
           <p:cNvPr id="5" name="Text Placeholder 4">
             <a:extLst>
               <a:ext uri="{FF2B5EF4-FFF2-40B4-BE49-F238E27FC236}">
-                <a16:creationId xmlns:a16="http://schemas.microsoft.com/office/drawing/2014/main" id="{0A02A238-97FC-4DF8-BF6C-5DE0EEA955E8}"/>
+                <a16:creationId xmlns:a16="http://schemas.microsoft.com/office/drawing/2014/main" id="{103E9935-1749-4396-B27F-8954115F216F}"/>
               </a:ext>
             </a:extLst>
           </p:cNvPr>
@@ -3803,7 +3941,7 @@
     </p:spTree>
     <p:extLst>
       <p:ext uri="{BB962C8B-B14F-4D97-AF65-F5344CB8AC3E}">
-        <p14:creationId xmlns:p14="http://schemas.microsoft.com/office/powerpoint/2010/main" val="4039639124"/>
+        <p14:creationId xmlns:p14="http://schemas.microsoft.com/office/powerpoint/2010/main" val="2654345321"/>
       </p:ext>
     </p:extLst>
   </p:cSld>
@@ -3835,7 +3973,7 @@
           <p:cNvPr id="4" name="Title 3">
             <a:extLst>
               <a:ext uri="{FF2B5EF4-FFF2-40B4-BE49-F238E27FC236}">
-                <a16:creationId xmlns:a16="http://schemas.microsoft.com/office/drawing/2014/main" id="{9003BC5A-132B-4CB1-B847-6CB4A3F1DBA3}"/>
+                <a16:creationId xmlns:a16="http://schemas.microsoft.com/office/drawing/2014/main" id="{EDD87FE7-999B-4773-B2A2-9FC63A793D0E}"/>
               </a:ext>
             </a:extLst>
           </p:cNvPr>
@@ -3860,7 +3998,7 @@
           <p:cNvPr id="5" name="Content Placeholder 4">
             <a:extLst>
               <a:ext uri="{FF2B5EF4-FFF2-40B4-BE49-F238E27FC236}">
-                <a16:creationId xmlns:a16="http://schemas.microsoft.com/office/drawing/2014/main" id="{3177367B-5D7B-4493-B2F8-B3115A56889D}"/>
+                <a16:creationId xmlns:a16="http://schemas.microsoft.com/office/drawing/2014/main" id="{9E798467-FC1A-4BAF-9580-AC25916B8ED0}"/>
               </a:ext>
             </a:extLst>
           </p:cNvPr>
@@ -3885,7 +4023,7 @@
           <p:cNvPr id="6" name="Content Placeholder 5">
             <a:extLst>
               <a:ext uri="{FF2B5EF4-FFF2-40B4-BE49-F238E27FC236}">
-                <a16:creationId xmlns:a16="http://schemas.microsoft.com/office/drawing/2014/main" id="{BFA950EF-CD64-448F-AC5E-000307D9D01A}"/>
+                <a16:creationId xmlns:a16="http://schemas.microsoft.com/office/drawing/2014/main" id="{4781CFB5-FB17-4F5B-A42D-DB648B7F5D3E}"/>
               </a:ext>
             </a:extLst>
           </p:cNvPr>
@@ -3908,7 +4046,7 @@
     </p:spTree>
     <p:extLst>
       <p:ext uri="{BB962C8B-B14F-4D97-AF65-F5344CB8AC3E}">
-        <p14:creationId xmlns:p14="http://schemas.microsoft.com/office/powerpoint/2010/main" val="3377386340"/>
+        <p14:creationId xmlns:p14="http://schemas.microsoft.com/office/powerpoint/2010/main" val="201477786"/>
       </p:ext>
     </p:extLst>
   </p:cSld>
@@ -3921,7 +4059,7 @@
 <file path=ppt/theme/theme1.xml><?xml version="1.0" encoding="utf-8"?>
 <a:theme xmlns:a="http://schemas.openxmlformats.org/drawingml/2006/main" name="Office Theme">
   <a:themeElements>
-    <a:clrScheme name="Office Theme">
+    <a:clrScheme name="Office">
       <a:dk1>
         <a:sysClr val="windowText" lastClr="000000"/>
       </a:dk1>
@@ -3971,7 +4109,7 @@
         <a:cs typeface=""/>
       </a:minorFont>
     </a:fontScheme>
-    <a:fmtScheme name="Office Theme">
+    <a:fmtScheme name="Office">
       <a:fillStyleLst>
         <a:solidFill>
           <a:schemeClr val="phClr"/>

</xml_diff>